<commit_message>
clean up directory and update slides
</commit_message>
<xml_diff>
--- a/Slides/presenting results.pptx
+++ b/Slides/presenting results.pptx
@@ -5,33 +5,27 @@
     <p:sldMasterId id="2147483782" r:id="rId1"/>
   </p:sldMasterIdLst>
   <p:notesMasterIdLst>
-    <p:notesMasterId r:id="rId23"/>
+    <p:notesMasterId r:id="rId17"/>
   </p:notesMasterIdLst>
   <p:handoutMasterIdLst>
-    <p:handoutMasterId r:id="rId24"/>
+    <p:handoutMasterId r:id="rId18"/>
   </p:handoutMasterIdLst>
   <p:sldIdLst>
     <p:sldId id="488" r:id="rId2"/>
-    <p:sldId id="493" r:id="rId3"/>
-    <p:sldId id="494" r:id="rId4"/>
-    <p:sldId id="495" r:id="rId5"/>
-    <p:sldId id="497" r:id="rId6"/>
-    <p:sldId id="498" r:id="rId7"/>
-    <p:sldId id="499" r:id="rId8"/>
-    <p:sldId id="500" r:id="rId9"/>
-    <p:sldId id="501" r:id="rId10"/>
-    <p:sldId id="502" r:id="rId11"/>
-    <p:sldId id="503" r:id="rId12"/>
-    <p:sldId id="504" r:id="rId13"/>
-    <p:sldId id="505" r:id="rId14"/>
-    <p:sldId id="509" r:id="rId15"/>
-    <p:sldId id="506" r:id="rId16"/>
-    <p:sldId id="507" r:id="rId17"/>
-    <p:sldId id="508" r:id="rId18"/>
-    <p:sldId id="491" r:id="rId19"/>
-    <p:sldId id="510" r:id="rId20"/>
-    <p:sldId id="489" r:id="rId21"/>
-    <p:sldId id="490" r:id="rId22"/>
+    <p:sldId id="511" r:id="rId3"/>
+    <p:sldId id="495" r:id="rId4"/>
+    <p:sldId id="497" r:id="rId5"/>
+    <p:sldId id="498" r:id="rId6"/>
+    <p:sldId id="499" r:id="rId7"/>
+    <p:sldId id="500" r:id="rId8"/>
+    <p:sldId id="501" r:id="rId9"/>
+    <p:sldId id="502" r:id="rId10"/>
+    <p:sldId id="503" r:id="rId11"/>
+    <p:sldId id="504" r:id="rId12"/>
+    <p:sldId id="505" r:id="rId13"/>
+    <p:sldId id="506" r:id="rId14"/>
+    <p:sldId id="507" r:id="rId15"/>
+    <p:sldId id="510" r:id="rId16"/>
   </p:sldIdLst>
   <p:sldSz cx="12192000" cy="6858000"/>
   <p:notesSz cx="7010400" cy="9296400"/>
@@ -509,7 +503,7 @@
               <a:pPr>
                 <a:defRPr/>
               </a:pPr>
-              <a:t>4/7/2019</a:t>
+              <a:t>12/20/2021</a:t>
             </a:fld>
             <a:endParaRPr lang="en-US"/>
           </a:p>
@@ -5475,7 +5469,7 @@
           <a:p>
             <a:r>
               <a:rPr lang="en-US" sz="4000" dirty="0"/>
-              <a:t>Presenting our results on PCV impact in Latin America</a:t>
+              <a:t>Presenting your findings</a:t>
             </a:r>
           </a:p>
         </p:txBody>
@@ -5663,7 +5657,7 @@
           <p:cNvPr id="2" name="Title 1">
             <a:extLst>
               <a:ext uri="{FF2B5EF4-FFF2-40B4-BE49-F238E27FC236}">
-                <a16:creationId xmlns:a16="http://schemas.microsoft.com/office/drawing/2014/main" id="{6C9AFDC2-8F94-4777-8771-C43AAB8B4441}"/>
+                <a16:creationId xmlns:a16="http://schemas.microsoft.com/office/drawing/2014/main" id="{29C49B1D-607E-49C3-921C-22A5CABBB4EC}"/>
               </a:ext>
             </a:extLst>
           </p:cNvPr>
@@ -5681,8 +5675,33 @@
           <a:p>
             <a:r>
               <a:rPr lang="en-US" dirty="0"/>
-              <a:t>Stretch x-axis</a:t>
-            </a:r>
+              <a:t>Add ref line</a:t>
+            </a:r>
+          </a:p>
+        </p:txBody>
+      </p:sp>
+      <p:sp>
+        <p:nvSpPr>
+          <p:cNvPr id="3" name="Content Placeholder 2">
+            <a:extLst>
+              <a:ext uri="{FF2B5EF4-FFF2-40B4-BE49-F238E27FC236}">
+                <a16:creationId xmlns:a16="http://schemas.microsoft.com/office/drawing/2014/main" id="{FAC0CE2B-7B27-421E-8AF0-8BA60B79D232}"/>
+              </a:ext>
+            </a:extLst>
+          </p:cNvPr>
+          <p:cNvSpPr>
+            <a:spLocks noGrp="1"/>
+          </p:cNvSpPr>
+          <p:nvPr>
+            <p:ph idx="1"/>
+          </p:nvPr>
+        </p:nvSpPr>
+        <p:spPr/>
+        <p:txBody>
+          <a:bodyPr/>
+          <a:lstStyle/>
+          <a:p>
+            <a:endParaRPr lang="en-US"/>
           </a:p>
         </p:txBody>
       </p:sp>
@@ -5691,7 +5710,7 @@
           <p:cNvPr id="4" name="Picture 3">
             <a:extLst>
               <a:ext uri="{FF2B5EF4-FFF2-40B4-BE49-F238E27FC236}">
-                <a16:creationId xmlns:a16="http://schemas.microsoft.com/office/drawing/2014/main" id="{5C02037D-AFAC-4082-9B5D-1598D85E49F2}"/>
+                <a16:creationId xmlns:a16="http://schemas.microsoft.com/office/drawing/2014/main" id="{A684301D-B233-43CB-B507-8D1C1E2A896B}"/>
               </a:ext>
             </a:extLst>
           </p:cNvPr>
@@ -5708,18 +5727,72 @@
         </p:blipFill>
         <p:spPr>
           <a:xfrm>
-            <a:off x="2971800" y="1752600"/>
-            <a:ext cx="6485714" cy="4723809"/>
+            <a:off x="2753143" y="2156610"/>
+            <a:ext cx="6685714" cy="3990476"/>
           </a:xfrm>
           <a:prstGeom prst="rect">
             <a:avLst/>
           </a:prstGeom>
         </p:spPr>
       </p:pic>
+      <p:sp>
+        <p:nvSpPr>
+          <p:cNvPr id="5" name="Rectangle 4">
+            <a:extLst>
+              <a:ext uri="{FF2B5EF4-FFF2-40B4-BE49-F238E27FC236}">
+                <a16:creationId xmlns:a16="http://schemas.microsoft.com/office/drawing/2014/main" id="{10051337-EDEA-469E-A5A4-F7BC03475BD7}"/>
+              </a:ext>
+            </a:extLst>
+          </p:cNvPr>
+          <p:cNvSpPr/>
+          <p:nvPr/>
+        </p:nvSpPr>
+        <p:spPr>
+          <a:xfrm>
+            <a:off x="304800" y="6398697"/>
+            <a:ext cx="5365571" cy="369332"/>
+          </a:xfrm>
+          <a:prstGeom prst="rect">
+            <a:avLst/>
+          </a:prstGeom>
+        </p:spPr>
+        <p:txBody>
+          <a:bodyPr wrap="none">
+            <a:spAutoFit/>
+          </a:bodyPr>
+          <a:lstStyle/>
+          <a:p>
+            <a:r>
+              <a:rPr lang="en-US" dirty="0" err="1"/>
+              <a:t>abline</a:t>
+            </a:r>
+            <a:r>
+              <a:rPr lang="en-US" dirty="0"/>
+              <a:t>(v=(</a:t>
+            </a:r>
+            <a:r>
+              <a:rPr lang="en-US" dirty="0" err="1"/>
+              <a:t>as.Date</a:t>
+            </a:r>
+            <a:r>
+              <a:rPr lang="en-US" dirty="0"/>
+              <a:t>("2010-01-01")), </a:t>
+            </a:r>
+            <a:r>
+              <a:rPr lang="en-US" dirty="0" err="1"/>
+              <a:t>lty</a:t>
+            </a:r>
+            <a:r>
+              <a:rPr lang="en-US" dirty="0"/>
+              <a:t>=2, col='gray')</a:t>
+            </a:r>
+          </a:p>
+        </p:txBody>
+      </p:sp>
     </p:spTree>
     <p:extLst>
       <p:ext uri="{BB962C8B-B14F-4D97-AF65-F5344CB8AC3E}">
-        <p14:creationId xmlns:p14="http://schemas.microsoft.com/office/powerpoint/2010/main" val="3623414119"/>
+        <p14:creationId xmlns:p14="http://schemas.microsoft.com/office/powerpoint/2010/main" val="622291290"/>
       </p:ext>
     </p:extLst>
   </p:cSld>
@@ -5751,173 +5824,6 @@
           <p:cNvPr id="2" name="Title 1">
             <a:extLst>
               <a:ext uri="{FF2B5EF4-FFF2-40B4-BE49-F238E27FC236}">
-                <a16:creationId xmlns:a16="http://schemas.microsoft.com/office/drawing/2014/main" id="{29C49B1D-607E-49C3-921C-22A5CABBB4EC}"/>
-              </a:ext>
-            </a:extLst>
-          </p:cNvPr>
-          <p:cNvSpPr>
-            <a:spLocks noGrp="1"/>
-          </p:cNvSpPr>
-          <p:nvPr>
-            <p:ph type="title"/>
-          </p:nvPr>
-        </p:nvSpPr>
-        <p:spPr/>
-        <p:txBody>
-          <a:bodyPr/>
-          <a:lstStyle/>
-          <a:p>
-            <a:r>
-              <a:rPr lang="en-US" dirty="0"/>
-              <a:t>Add ref line</a:t>
-            </a:r>
-          </a:p>
-        </p:txBody>
-      </p:sp>
-      <p:sp>
-        <p:nvSpPr>
-          <p:cNvPr id="3" name="Content Placeholder 2">
-            <a:extLst>
-              <a:ext uri="{FF2B5EF4-FFF2-40B4-BE49-F238E27FC236}">
-                <a16:creationId xmlns:a16="http://schemas.microsoft.com/office/drawing/2014/main" id="{FAC0CE2B-7B27-421E-8AF0-8BA60B79D232}"/>
-              </a:ext>
-            </a:extLst>
-          </p:cNvPr>
-          <p:cNvSpPr>
-            <a:spLocks noGrp="1"/>
-          </p:cNvSpPr>
-          <p:nvPr>
-            <p:ph idx="1"/>
-          </p:nvPr>
-        </p:nvSpPr>
-        <p:spPr/>
-        <p:txBody>
-          <a:bodyPr/>
-          <a:lstStyle/>
-          <a:p>
-            <a:endParaRPr lang="en-US"/>
-          </a:p>
-        </p:txBody>
-      </p:sp>
-      <p:pic>
-        <p:nvPicPr>
-          <p:cNvPr id="4" name="Picture 3">
-            <a:extLst>
-              <a:ext uri="{FF2B5EF4-FFF2-40B4-BE49-F238E27FC236}">
-                <a16:creationId xmlns:a16="http://schemas.microsoft.com/office/drawing/2014/main" id="{A684301D-B233-43CB-B507-8D1C1E2A896B}"/>
-              </a:ext>
-            </a:extLst>
-          </p:cNvPr>
-          <p:cNvPicPr>
-            <a:picLocks noChangeAspect="1"/>
-          </p:cNvPicPr>
-          <p:nvPr/>
-        </p:nvPicPr>
-        <p:blipFill>
-          <a:blip r:embed="rId2"/>
-          <a:stretch>
-            <a:fillRect/>
-          </a:stretch>
-        </p:blipFill>
-        <p:spPr>
-          <a:xfrm>
-            <a:off x="2753143" y="2156610"/>
-            <a:ext cx="6685714" cy="3990476"/>
-          </a:xfrm>
-          <a:prstGeom prst="rect">
-            <a:avLst/>
-          </a:prstGeom>
-        </p:spPr>
-      </p:pic>
-      <p:sp>
-        <p:nvSpPr>
-          <p:cNvPr id="5" name="Rectangle 4">
-            <a:extLst>
-              <a:ext uri="{FF2B5EF4-FFF2-40B4-BE49-F238E27FC236}">
-                <a16:creationId xmlns:a16="http://schemas.microsoft.com/office/drawing/2014/main" id="{10051337-EDEA-469E-A5A4-F7BC03475BD7}"/>
-              </a:ext>
-            </a:extLst>
-          </p:cNvPr>
-          <p:cNvSpPr/>
-          <p:nvPr/>
-        </p:nvSpPr>
-        <p:spPr>
-          <a:xfrm>
-            <a:off x="304800" y="6398697"/>
-            <a:ext cx="5365571" cy="369332"/>
-          </a:xfrm>
-          <a:prstGeom prst="rect">
-            <a:avLst/>
-          </a:prstGeom>
-        </p:spPr>
-        <p:txBody>
-          <a:bodyPr wrap="none">
-            <a:spAutoFit/>
-          </a:bodyPr>
-          <a:lstStyle/>
-          <a:p>
-            <a:r>
-              <a:rPr lang="en-US" dirty="0" err="1"/>
-              <a:t>abline</a:t>
-            </a:r>
-            <a:r>
-              <a:rPr lang="en-US" dirty="0"/>
-              <a:t>(v=(</a:t>
-            </a:r>
-            <a:r>
-              <a:rPr lang="en-US" dirty="0" err="1"/>
-              <a:t>as.Date</a:t>
-            </a:r>
-            <a:r>
-              <a:rPr lang="en-US" dirty="0"/>
-              <a:t>("2010-01-01")), </a:t>
-            </a:r>
-            <a:r>
-              <a:rPr lang="en-US" dirty="0" err="1"/>
-              <a:t>lty</a:t>
-            </a:r>
-            <a:r>
-              <a:rPr lang="en-US" dirty="0"/>
-              <a:t>=2, col='gray')</a:t>
-            </a:r>
-          </a:p>
-        </p:txBody>
-      </p:sp>
-    </p:spTree>
-    <p:extLst>
-      <p:ext uri="{BB962C8B-B14F-4D97-AF65-F5344CB8AC3E}">
-        <p14:creationId xmlns:p14="http://schemas.microsoft.com/office/powerpoint/2010/main" val="622291290"/>
-      </p:ext>
-    </p:extLst>
-  </p:cSld>
-  <p:clrMapOvr>
-    <a:masterClrMapping/>
-  </p:clrMapOvr>
-</p:sld>
-</file>
-
-<file path=ppt/slides/slide12.xml><?xml version="1.0" encoding="utf-8"?>
-<p:sld xmlns:a="http://schemas.openxmlformats.org/drawingml/2006/main" xmlns:r="http://schemas.openxmlformats.org/officeDocument/2006/relationships" xmlns:p="http://schemas.openxmlformats.org/presentationml/2006/main">
-  <p:cSld>
-    <p:spTree>
-      <p:nvGrpSpPr>
-        <p:cNvPr id="1" name=""/>
-        <p:cNvGrpSpPr/>
-        <p:nvPr/>
-      </p:nvGrpSpPr>
-      <p:grpSpPr>
-        <a:xfrm>
-          <a:off x="0" y="0"/>
-          <a:ext cx="0" cy="0"/>
-          <a:chOff x="0" y="0"/>
-          <a:chExt cx="0" cy="0"/>
-        </a:xfrm>
-      </p:grpSpPr>
-      <p:sp>
-        <p:nvSpPr>
-          <p:cNvPr id="2" name="Title 1">
-            <a:extLst>
-              <a:ext uri="{FF2B5EF4-FFF2-40B4-BE49-F238E27FC236}">
                 <a16:creationId xmlns:a16="http://schemas.microsoft.com/office/drawing/2014/main" id="{3375AC62-29B1-4E3F-A42A-A0692D711B0C}"/>
               </a:ext>
             </a:extLst>
@@ -6189,7 +6095,7 @@
 </p:sld>
 </file>
 
-<file path=ppt/slides/slide13.xml><?xml version="1.0" encoding="utf-8"?>
+<file path=ppt/slides/slide12.xml><?xml version="1.0" encoding="utf-8"?>
 <p:sld xmlns:a="http://schemas.openxmlformats.org/drawingml/2006/main" xmlns:r="http://schemas.openxmlformats.org/officeDocument/2006/relationships" xmlns:p="http://schemas.openxmlformats.org/presentationml/2006/main">
   <p:cSld>
     <p:spTree>
@@ -6284,6 +6190,155 @@
 </p:sld>
 </file>
 
+<file path=ppt/slides/slide13.xml><?xml version="1.0" encoding="utf-8"?>
+<p:sld xmlns:a="http://schemas.openxmlformats.org/drawingml/2006/main" xmlns:r="http://schemas.openxmlformats.org/officeDocument/2006/relationships" xmlns:p="http://schemas.openxmlformats.org/presentationml/2006/main">
+  <p:cSld>
+    <p:spTree>
+      <p:nvGrpSpPr>
+        <p:cNvPr id="1" name=""/>
+        <p:cNvGrpSpPr/>
+        <p:nvPr/>
+      </p:nvGrpSpPr>
+      <p:grpSpPr>
+        <a:xfrm>
+          <a:off x="0" y="0"/>
+          <a:ext cx="0" cy="0"/>
+          <a:chOff x="0" y="0"/>
+          <a:chExt cx="0" cy="0"/>
+        </a:xfrm>
+      </p:grpSpPr>
+      <p:sp>
+        <p:nvSpPr>
+          <p:cNvPr id="2" name="Title 1">
+            <a:extLst>
+              <a:ext uri="{FF2B5EF4-FFF2-40B4-BE49-F238E27FC236}">
+                <a16:creationId xmlns:a16="http://schemas.microsoft.com/office/drawing/2014/main" id="{73F0C4FC-BE6A-402E-A2C0-D265559E8418}"/>
+              </a:ext>
+            </a:extLst>
+          </p:cNvPr>
+          <p:cNvSpPr>
+            <a:spLocks noGrp="1"/>
+          </p:cNvSpPr>
+          <p:nvPr>
+            <p:ph type="title"/>
+          </p:nvPr>
+        </p:nvSpPr>
+        <p:spPr/>
+        <p:txBody>
+          <a:bodyPr/>
+          <a:lstStyle/>
+          <a:p>
+            <a:r>
+              <a:rPr lang="en-US" dirty="0"/>
+              <a:t>Using colors</a:t>
+            </a:r>
+          </a:p>
+        </p:txBody>
+      </p:sp>
+      <p:sp>
+        <p:nvSpPr>
+          <p:cNvPr id="3" name="Content Placeholder 2">
+            <a:extLst>
+              <a:ext uri="{FF2B5EF4-FFF2-40B4-BE49-F238E27FC236}">
+                <a16:creationId xmlns:a16="http://schemas.microsoft.com/office/drawing/2014/main" id="{46FD70F0-B444-4E89-BF0D-88E1909DCA85}"/>
+              </a:ext>
+            </a:extLst>
+          </p:cNvPr>
+          <p:cNvSpPr>
+            <a:spLocks noGrp="1"/>
+          </p:cNvSpPr>
+          <p:nvPr>
+            <p:ph idx="1"/>
+          </p:nvPr>
+        </p:nvSpPr>
+        <p:spPr/>
+        <p:txBody>
+          <a:bodyPr/>
+          <a:lstStyle/>
+          <a:p>
+            <a:r>
+              <a:rPr lang="en-US" dirty="0">
+                <a:hlinkClick r:id="rId2"/>
+              </a:rPr>
+              <a:t>http://colorbrewer2.org</a:t>
+            </a:r>
+            <a:endParaRPr lang="en-US" dirty="0"/>
+          </a:p>
+          <a:p>
+            <a:endParaRPr lang="en-US" dirty="0"/>
+          </a:p>
+          <a:p>
+            <a:r>
+              <a:rPr lang="en-US" dirty="0" err="1"/>
+              <a:t>RColorBrewer</a:t>
+            </a:r>
+            <a:r>
+              <a:rPr lang="en-US" dirty="0"/>
+              <a:t> package</a:t>
+            </a:r>
+          </a:p>
+          <a:p>
+            <a:pPr marL="457200" lvl="1" indent="0">
+              <a:buNone/>
+            </a:pPr>
+            <a:r>
+              <a:rPr lang="en-US" dirty="0"/>
+              <a:t>library(</a:t>
+            </a:r>
+            <a:r>
+              <a:rPr lang="en-US" dirty="0" err="1"/>
+              <a:t>RColorBrewer</a:t>
+            </a:r>
+            <a:r>
+              <a:rPr lang="en-US" dirty="0"/>
+              <a:t>)</a:t>
+            </a:r>
+          </a:p>
+          <a:p>
+            <a:pPr marL="457200" lvl="1" indent="0">
+              <a:buNone/>
+            </a:pPr>
+            <a:r>
+              <a:rPr lang="en-US" dirty="0" err="1"/>
+              <a:t>display.brewer.all</a:t>
+            </a:r>
+            <a:r>
+              <a:rPr lang="en-US" dirty="0"/>
+              <a:t>()</a:t>
+            </a:r>
+          </a:p>
+          <a:p>
+            <a:pPr marL="457200" lvl="1" indent="0">
+              <a:buNone/>
+            </a:pPr>
+            <a:r>
+              <a:rPr lang="en-US" dirty="0"/>
+              <a:t>pal1&lt;- </a:t>
+            </a:r>
+            <a:r>
+              <a:rPr lang="en-US" dirty="0" err="1"/>
+              <a:t>brewer.pal</a:t>
+            </a:r>
+            <a:r>
+              <a:rPr lang="en-US" dirty="0"/>
+              <a:t>(4, 'Set1’) #4 color palette from color Set1</a:t>
+            </a:r>
+          </a:p>
+        </p:txBody>
+      </p:sp>
+    </p:spTree>
+    <p:extLst>
+      <p:ext uri="{BB962C8B-B14F-4D97-AF65-F5344CB8AC3E}">
+        <p14:creationId xmlns:p14="http://schemas.microsoft.com/office/powerpoint/2010/main" val="3847553184"/>
+      </p:ext>
+    </p:extLst>
+  </p:cSld>
+  <p:clrMapOvr>
+    <a:masterClrMapping/>
+  </p:clrMapOvr>
+</p:sld>
+</file>
+
 <file path=ppt/slides/slide14.xml><?xml version="1.0" encoding="utf-8"?>
 <p:sld xmlns:a="http://schemas.openxmlformats.org/drawingml/2006/main" xmlns:r="http://schemas.openxmlformats.org/officeDocument/2006/relationships" xmlns:p="http://schemas.openxmlformats.org/presentationml/2006/main">
   <p:cSld>
@@ -6306,464 +6361,6 @@
           <p:cNvPr id="2" name="Title 1">
             <a:extLst>
               <a:ext uri="{FF2B5EF4-FFF2-40B4-BE49-F238E27FC236}">
-                <a16:creationId xmlns:a16="http://schemas.microsoft.com/office/drawing/2014/main" id="{EF5FA9E9-3749-4511-87FE-E420DC8A3B4D}"/>
-              </a:ext>
-            </a:extLst>
-          </p:cNvPr>
-          <p:cNvSpPr>
-            <a:spLocks noGrp="1"/>
-          </p:cNvSpPr>
-          <p:nvPr>
-            <p:ph type="title"/>
-          </p:nvPr>
-        </p:nvSpPr>
-        <p:spPr/>
-        <p:txBody>
-          <a:bodyPr/>
-          <a:lstStyle/>
-          <a:p>
-            <a:r>
-              <a:rPr lang="en-US" dirty="0"/>
-              <a:t>In SAS</a:t>
-            </a:r>
-          </a:p>
-        </p:txBody>
-      </p:sp>
-      <p:sp>
-        <p:nvSpPr>
-          <p:cNvPr id="3" name="Content Placeholder 2">
-            <a:extLst>
-              <a:ext uri="{FF2B5EF4-FFF2-40B4-BE49-F238E27FC236}">
-                <a16:creationId xmlns:a16="http://schemas.microsoft.com/office/drawing/2014/main" id="{AB099F41-F3EB-417E-8FDD-9595FC2F0C27}"/>
-              </a:ext>
-            </a:extLst>
-          </p:cNvPr>
-          <p:cNvSpPr>
-            <a:spLocks noGrp="1"/>
-          </p:cNvSpPr>
-          <p:nvPr>
-            <p:ph idx="1"/>
-          </p:nvPr>
-        </p:nvSpPr>
-        <p:spPr/>
-        <p:txBody>
-          <a:bodyPr/>
-          <a:lstStyle/>
-          <a:p>
-            <a:pPr marL="0" indent="0">
-              <a:buNone/>
-            </a:pPr>
-            <a:r>
-              <a:rPr lang="en-US" dirty="0"/>
-              <a:t>				</a:t>
-            </a:r>
-            <a:r>
-              <a:rPr lang="en-US" sz="1000" b="1" dirty="0"/>
-              <a:t>proc</a:t>
-            </a:r>
-            <a:r>
-              <a:rPr lang="en-US" sz="1000" dirty="0"/>
-              <a:t> </a:t>
-            </a:r>
-            <a:r>
-              <a:rPr lang="en-US" sz="1000" b="1" dirty="0"/>
-              <a:t>template</a:t>
-            </a:r>
-            <a:r>
-              <a:rPr lang="en-US" sz="1000" dirty="0"/>
-              <a:t>;</a:t>
-            </a:r>
-          </a:p>
-          <a:p>
-            <a:pPr marL="0" indent="0">
-              <a:buNone/>
-            </a:pPr>
-            <a:r>
-              <a:rPr lang="en-US" sz="1000" dirty="0"/>
-              <a:t>				   define style </a:t>
-            </a:r>
-            <a:r>
-              <a:rPr lang="en-US" sz="1000" dirty="0" err="1"/>
-              <a:t>nicestyle</a:t>
-            </a:r>
-            <a:r>
-              <a:rPr lang="en-US" sz="1000" dirty="0"/>
-              <a:t>;</a:t>
-            </a:r>
-          </a:p>
-          <a:p>
-            <a:pPr marL="0" indent="0">
-              <a:buNone/>
-            </a:pPr>
-            <a:r>
-              <a:rPr lang="en-US" sz="1000" dirty="0"/>
-              <a:t>				   parent=</a:t>
-            </a:r>
-            <a:r>
-              <a:rPr lang="en-US" sz="1000" dirty="0" err="1"/>
-              <a:t>styles.default</a:t>
-            </a:r>
-            <a:r>
-              <a:rPr lang="en-US" sz="1000" dirty="0"/>
-              <a:t>;</a:t>
-            </a:r>
-          </a:p>
-          <a:p>
-            <a:pPr marL="0" indent="0">
-              <a:buNone/>
-            </a:pPr>
-            <a:r>
-              <a:rPr lang="en-US" sz="1000" dirty="0"/>
-              <a:t>				      class </a:t>
-            </a:r>
-            <a:r>
-              <a:rPr lang="en-US" sz="1000" dirty="0" err="1"/>
-              <a:t>graphwalls</a:t>
-            </a:r>
-            <a:r>
-              <a:rPr lang="en-US" sz="1000" dirty="0"/>
-              <a:t> / </a:t>
-            </a:r>
-          </a:p>
-          <a:p>
-            <a:pPr marL="0" indent="0">
-              <a:buNone/>
-            </a:pPr>
-            <a:r>
-              <a:rPr lang="en-US" sz="1000" dirty="0"/>
-              <a:t>				            frameborder=off;</a:t>
-            </a:r>
-          </a:p>
-          <a:p>
-            <a:pPr marL="0" indent="0">
-              <a:buNone/>
-            </a:pPr>
-            <a:r>
-              <a:rPr lang="en-US" sz="1000" dirty="0"/>
-              <a:t>				      class </a:t>
-            </a:r>
-            <a:r>
-              <a:rPr lang="en-US" sz="1000" dirty="0" err="1"/>
-              <a:t>graphbackground</a:t>
-            </a:r>
-            <a:r>
-              <a:rPr lang="en-US" sz="1000" dirty="0"/>
-              <a:t> / </a:t>
-            </a:r>
-          </a:p>
-          <a:p>
-            <a:pPr marL="0" indent="0">
-              <a:buNone/>
-            </a:pPr>
-            <a:r>
-              <a:rPr lang="en-US" sz="1000" dirty="0"/>
-              <a:t>				            color=white;</a:t>
-            </a:r>
-          </a:p>
-          <a:p>
-            <a:pPr marL="0" indent="0">
-              <a:buNone/>
-            </a:pPr>
-            <a:r>
-              <a:rPr lang="en-US" sz="1000" dirty="0"/>
-              <a:t>				   end;</a:t>
-            </a:r>
-          </a:p>
-          <a:p>
-            <a:pPr marL="0" indent="0">
-              <a:buNone/>
-            </a:pPr>
-            <a:r>
-              <a:rPr lang="en-US" sz="1000" dirty="0"/>
-              <a:t>				</a:t>
-            </a:r>
-            <a:r>
-              <a:rPr lang="en-US" sz="1000" b="1" dirty="0"/>
-              <a:t>run</a:t>
-            </a:r>
-            <a:r>
-              <a:rPr lang="en-US" sz="1000" dirty="0"/>
-              <a:t>;</a:t>
-            </a:r>
-          </a:p>
-          <a:p>
-            <a:pPr marL="0" indent="0">
-              <a:buNone/>
-            </a:pPr>
-            <a:r>
-              <a:rPr lang="en-US" sz="1000" dirty="0"/>
-              <a:t>		ODS listing  IMAGE_DPI=800 style=</a:t>
-            </a:r>
-            <a:r>
-              <a:rPr lang="en-US" sz="1000" dirty="0" err="1"/>
-              <a:t>nicestyle</a:t>
-            </a:r>
-            <a:r>
-              <a:rPr lang="en-US" sz="1000" dirty="0"/>
-              <a:t>;</a:t>
-            </a:r>
-          </a:p>
-          <a:p>
-            <a:pPr marL="0" indent="0">
-              <a:buNone/>
-            </a:pPr>
-            <a:r>
-              <a:rPr lang="en-US" sz="1000" dirty="0"/>
-              <a:t>		</a:t>
-            </a:r>
-            <a:r>
-              <a:rPr lang="en-US" sz="1000" dirty="0" err="1"/>
-              <a:t>ods</a:t>
-            </a:r>
-            <a:r>
-              <a:rPr lang="en-US" sz="1000" dirty="0"/>
-              <a:t> graphics on/ border=off  width=6in height=4in ;</a:t>
-            </a:r>
-          </a:p>
-          <a:p>
-            <a:pPr marL="0" indent="0">
-              <a:buNone/>
-            </a:pPr>
-            <a:r>
-              <a:rPr lang="en-US" sz="1000" dirty="0"/>
-              <a:t>				proc </a:t>
-            </a:r>
-            <a:r>
-              <a:rPr lang="en-US" sz="1000" dirty="0" err="1"/>
-              <a:t>sgplot</a:t>
-            </a:r>
-            <a:r>
-              <a:rPr lang="en-US" sz="1000" dirty="0"/>
-              <a:t> data=ds1;</a:t>
-            </a:r>
-          </a:p>
-          <a:p>
-            <a:pPr marL="0" indent="0">
-              <a:buNone/>
-            </a:pPr>
-            <a:r>
-              <a:rPr lang="en-US" sz="1000" dirty="0"/>
-              <a:t>				series x=date y=J12_18/</a:t>
-            </a:r>
-          </a:p>
-          <a:p>
-            <a:pPr marL="0" indent="0">
-              <a:buNone/>
-            </a:pPr>
-            <a:r>
-              <a:rPr lang="en-US" sz="1000" dirty="0"/>
-              <a:t>				 </a:t>
-            </a:r>
-            <a:r>
-              <a:rPr lang="en-US" sz="1000" dirty="0" err="1"/>
-              <a:t>lineattrs</a:t>
-            </a:r>
-            <a:r>
-              <a:rPr lang="en-US" sz="1000" dirty="0"/>
-              <a:t>=(thickness=1 pattern=solid color=black);</a:t>
-            </a:r>
-          </a:p>
-          <a:p>
-            <a:pPr marL="0" indent="0">
-              <a:buNone/>
-            </a:pPr>
-            <a:r>
-              <a:rPr lang="en-US" sz="1000" dirty="0"/>
-              <a:t>			run;</a:t>
-            </a:r>
-          </a:p>
-          <a:p>
-            <a:pPr marL="0" indent="0">
-              <a:buNone/>
-            </a:pPr>
-            <a:endParaRPr lang="en-US" sz="1000" dirty="0"/>
-          </a:p>
-        </p:txBody>
-      </p:sp>
-    </p:spTree>
-    <p:extLst>
-      <p:ext uri="{BB962C8B-B14F-4D97-AF65-F5344CB8AC3E}">
-        <p14:creationId xmlns:p14="http://schemas.microsoft.com/office/powerpoint/2010/main" val="3043784496"/>
-      </p:ext>
-    </p:extLst>
-  </p:cSld>
-  <p:clrMapOvr>
-    <a:masterClrMapping/>
-  </p:clrMapOvr>
-</p:sld>
-</file>
-
-<file path=ppt/slides/slide15.xml><?xml version="1.0" encoding="utf-8"?>
-<p:sld xmlns:a="http://schemas.openxmlformats.org/drawingml/2006/main" xmlns:r="http://schemas.openxmlformats.org/officeDocument/2006/relationships" xmlns:p="http://schemas.openxmlformats.org/presentationml/2006/main">
-  <p:cSld>
-    <p:spTree>
-      <p:nvGrpSpPr>
-        <p:cNvPr id="1" name=""/>
-        <p:cNvGrpSpPr/>
-        <p:nvPr/>
-      </p:nvGrpSpPr>
-      <p:grpSpPr>
-        <a:xfrm>
-          <a:off x="0" y="0"/>
-          <a:ext cx="0" cy="0"/>
-          <a:chOff x="0" y="0"/>
-          <a:chExt cx="0" cy="0"/>
-        </a:xfrm>
-      </p:grpSpPr>
-      <p:sp>
-        <p:nvSpPr>
-          <p:cNvPr id="2" name="Title 1">
-            <a:extLst>
-              <a:ext uri="{FF2B5EF4-FFF2-40B4-BE49-F238E27FC236}">
-                <a16:creationId xmlns:a16="http://schemas.microsoft.com/office/drawing/2014/main" id="{73F0C4FC-BE6A-402E-A2C0-D265559E8418}"/>
-              </a:ext>
-            </a:extLst>
-          </p:cNvPr>
-          <p:cNvSpPr>
-            <a:spLocks noGrp="1"/>
-          </p:cNvSpPr>
-          <p:nvPr>
-            <p:ph type="title"/>
-          </p:nvPr>
-        </p:nvSpPr>
-        <p:spPr/>
-        <p:txBody>
-          <a:bodyPr/>
-          <a:lstStyle/>
-          <a:p>
-            <a:r>
-              <a:rPr lang="en-US" dirty="0"/>
-              <a:t>Using colors</a:t>
-            </a:r>
-          </a:p>
-        </p:txBody>
-      </p:sp>
-      <p:sp>
-        <p:nvSpPr>
-          <p:cNvPr id="3" name="Content Placeholder 2">
-            <a:extLst>
-              <a:ext uri="{FF2B5EF4-FFF2-40B4-BE49-F238E27FC236}">
-                <a16:creationId xmlns:a16="http://schemas.microsoft.com/office/drawing/2014/main" id="{46FD70F0-B444-4E89-BF0D-88E1909DCA85}"/>
-              </a:ext>
-            </a:extLst>
-          </p:cNvPr>
-          <p:cNvSpPr>
-            <a:spLocks noGrp="1"/>
-          </p:cNvSpPr>
-          <p:nvPr>
-            <p:ph idx="1"/>
-          </p:nvPr>
-        </p:nvSpPr>
-        <p:spPr/>
-        <p:txBody>
-          <a:bodyPr/>
-          <a:lstStyle/>
-          <a:p>
-            <a:r>
-              <a:rPr lang="en-US" dirty="0">
-                <a:hlinkClick r:id="rId2"/>
-              </a:rPr>
-              <a:t>http://colorbrewer2.org</a:t>
-            </a:r>
-            <a:endParaRPr lang="en-US" dirty="0"/>
-          </a:p>
-          <a:p>
-            <a:endParaRPr lang="en-US" dirty="0"/>
-          </a:p>
-          <a:p>
-            <a:r>
-              <a:rPr lang="en-US" dirty="0" err="1"/>
-              <a:t>RColorBrewer</a:t>
-            </a:r>
-            <a:r>
-              <a:rPr lang="en-US" dirty="0"/>
-              <a:t> package</a:t>
-            </a:r>
-          </a:p>
-          <a:p>
-            <a:pPr marL="457200" lvl="1" indent="0">
-              <a:buNone/>
-            </a:pPr>
-            <a:r>
-              <a:rPr lang="en-US" dirty="0"/>
-              <a:t>library(</a:t>
-            </a:r>
-            <a:r>
-              <a:rPr lang="en-US" dirty="0" err="1"/>
-              <a:t>RColorBrewer</a:t>
-            </a:r>
-            <a:r>
-              <a:rPr lang="en-US" dirty="0"/>
-              <a:t>)</a:t>
-            </a:r>
-          </a:p>
-          <a:p>
-            <a:pPr marL="457200" lvl="1" indent="0">
-              <a:buNone/>
-            </a:pPr>
-            <a:r>
-              <a:rPr lang="en-US" dirty="0" err="1"/>
-              <a:t>display.brewer.all</a:t>
-            </a:r>
-            <a:r>
-              <a:rPr lang="en-US" dirty="0"/>
-              <a:t>()</a:t>
-            </a:r>
-          </a:p>
-          <a:p>
-            <a:pPr marL="457200" lvl="1" indent="0">
-              <a:buNone/>
-            </a:pPr>
-            <a:r>
-              <a:rPr lang="en-US" dirty="0"/>
-              <a:t>pal1&lt;- </a:t>
-            </a:r>
-            <a:r>
-              <a:rPr lang="en-US" dirty="0" err="1"/>
-              <a:t>brewer.pal</a:t>
-            </a:r>
-            <a:r>
-              <a:rPr lang="en-US" dirty="0"/>
-              <a:t>(4, 'Set1’) #4 color palette from color Set1</a:t>
-            </a:r>
-          </a:p>
-        </p:txBody>
-      </p:sp>
-    </p:spTree>
-    <p:extLst>
-      <p:ext uri="{BB962C8B-B14F-4D97-AF65-F5344CB8AC3E}">
-        <p14:creationId xmlns:p14="http://schemas.microsoft.com/office/powerpoint/2010/main" val="3847553184"/>
-      </p:ext>
-    </p:extLst>
-  </p:cSld>
-  <p:clrMapOvr>
-    <a:masterClrMapping/>
-  </p:clrMapOvr>
-</p:sld>
-</file>
-
-<file path=ppt/slides/slide16.xml><?xml version="1.0" encoding="utf-8"?>
-<p:sld xmlns:a="http://schemas.openxmlformats.org/drawingml/2006/main" xmlns:r="http://schemas.openxmlformats.org/officeDocument/2006/relationships" xmlns:p="http://schemas.openxmlformats.org/presentationml/2006/main">
-  <p:cSld>
-    <p:spTree>
-      <p:nvGrpSpPr>
-        <p:cNvPr id="1" name=""/>
-        <p:cNvGrpSpPr/>
-        <p:nvPr/>
-      </p:nvGrpSpPr>
-      <p:grpSpPr>
-        <a:xfrm>
-          <a:off x="0" y="0"/>
-          <a:ext cx="0" cy="0"/>
-          <a:chOff x="0" y="0"/>
-          <a:chExt cx="0" cy="0"/>
-        </a:xfrm>
-      </p:grpSpPr>
-      <p:sp>
-        <p:nvSpPr>
-          <p:cNvPr id="2" name="Title 1">
-            <a:extLst>
-              <a:ext uri="{FF2B5EF4-FFF2-40B4-BE49-F238E27FC236}">
                 <a16:creationId xmlns:a16="http://schemas.microsoft.com/office/drawing/2014/main" id="{BB6970F8-162E-44F9-9E70-9C0D8D511109}"/>
               </a:ext>
             </a:extLst>
@@ -7132,162 +6729,7 @@
 </p:sld>
 </file>
 
-<file path=ppt/slides/slide17.xml><?xml version="1.0" encoding="utf-8"?>
-<p:sld xmlns:a="http://schemas.openxmlformats.org/drawingml/2006/main" xmlns:r="http://schemas.openxmlformats.org/officeDocument/2006/relationships" xmlns:p="http://schemas.openxmlformats.org/presentationml/2006/main">
-  <p:cSld>
-    <p:spTree>
-      <p:nvGrpSpPr>
-        <p:cNvPr id="1" name=""/>
-        <p:cNvGrpSpPr/>
-        <p:nvPr/>
-      </p:nvGrpSpPr>
-      <p:grpSpPr>
-        <a:xfrm>
-          <a:off x="0" y="0"/>
-          <a:ext cx="0" cy="0"/>
-          <a:chOff x="0" y="0"/>
-          <a:chExt cx="0" cy="0"/>
-        </a:xfrm>
-      </p:grpSpPr>
-      <p:sp>
-        <p:nvSpPr>
-          <p:cNvPr id="2" name="Title 1">
-            <a:extLst>
-              <a:ext uri="{FF2B5EF4-FFF2-40B4-BE49-F238E27FC236}">
-                <a16:creationId xmlns:a16="http://schemas.microsoft.com/office/drawing/2014/main" id="{D94E0291-474F-46EB-96F3-6C6B5D16D960}"/>
-              </a:ext>
-            </a:extLst>
-          </p:cNvPr>
-          <p:cNvSpPr>
-            <a:spLocks noGrp="1"/>
-          </p:cNvSpPr>
-          <p:nvPr>
-            <p:ph type="title"/>
-          </p:nvPr>
-        </p:nvSpPr>
-        <p:spPr>
-          <a:xfrm>
-            <a:off x="457200" y="2667000"/>
-            <a:ext cx="10972800" cy="1143000"/>
-          </a:xfrm>
-        </p:spPr>
-        <p:txBody>
-          <a:bodyPr/>
-          <a:lstStyle/>
-          <a:p>
-            <a:r>
-              <a:rPr lang="en-US" dirty="0"/>
-              <a:t>Wrapping up the case</a:t>
-            </a:r>
-          </a:p>
-        </p:txBody>
-      </p:sp>
-    </p:spTree>
-    <p:extLst>
-      <p:ext uri="{BB962C8B-B14F-4D97-AF65-F5344CB8AC3E}">
-        <p14:creationId xmlns:p14="http://schemas.microsoft.com/office/powerpoint/2010/main" val="1140679087"/>
-      </p:ext>
-    </p:extLst>
-  </p:cSld>
-  <p:clrMapOvr>
-    <a:masterClrMapping/>
-  </p:clrMapOvr>
-</p:sld>
-</file>
-
-<file path=ppt/slides/slide18.xml><?xml version="1.0" encoding="utf-8"?>
-<p:sld xmlns:a="http://schemas.openxmlformats.org/drawingml/2006/main" xmlns:r="http://schemas.openxmlformats.org/officeDocument/2006/relationships" xmlns:p="http://schemas.openxmlformats.org/presentationml/2006/main">
-  <p:cSld>
-    <p:spTree>
-      <p:nvGrpSpPr>
-        <p:cNvPr id="1" name=""/>
-        <p:cNvGrpSpPr/>
-        <p:nvPr/>
-      </p:nvGrpSpPr>
-      <p:grpSpPr>
-        <a:xfrm>
-          <a:off x="0" y="0"/>
-          <a:ext cx="0" cy="0"/>
-          <a:chOff x="0" y="0"/>
-          <a:chExt cx="0" cy="0"/>
-        </a:xfrm>
-      </p:grpSpPr>
-      <p:sp>
-        <p:nvSpPr>
-          <p:cNvPr id="2" name="Title 1">
-            <a:extLst>
-              <a:ext uri="{FF2B5EF4-FFF2-40B4-BE49-F238E27FC236}">
-                <a16:creationId xmlns:a16="http://schemas.microsoft.com/office/drawing/2014/main" id="{98559BED-0032-4C68-9169-7D8C62BF95F3}"/>
-              </a:ext>
-            </a:extLst>
-          </p:cNvPr>
-          <p:cNvSpPr>
-            <a:spLocks noGrp="1"/>
-          </p:cNvSpPr>
-          <p:nvPr>
-            <p:ph type="title"/>
-          </p:nvPr>
-        </p:nvSpPr>
-        <p:spPr/>
-        <p:txBody>
-          <a:bodyPr/>
-          <a:lstStyle/>
-          <a:p>
-            <a:r>
-              <a:rPr lang="en-US" dirty="0"/>
-              <a:t>A reminder about who we are</a:t>
-            </a:r>
-          </a:p>
-        </p:txBody>
-      </p:sp>
-      <p:sp>
-        <p:nvSpPr>
-          <p:cNvPr id="3" name="Content Placeholder 2">
-            <a:extLst>
-              <a:ext uri="{FF2B5EF4-FFF2-40B4-BE49-F238E27FC236}">
-                <a16:creationId xmlns:a16="http://schemas.microsoft.com/office/drawing/2014/main" id="{747B1076-61B5-429F-9BCC-D55CF6A0384C}"/>
-              </a:ext>
-            </a:extLst>
-          </p:cNvPr>
-          <p:cNvSpPr>
-            <a:spLocks noGrp="1"/>
-          </p:cNvSpPr>
-          <p:nvPr>
-            <p:ph idx="1"/>
-          </p:nvPr>
-        </p:nvSpPr>
-        <p:spPr/>
-        <p:txBody>
-          <a:bodyPr/>
-          <a:lstStyle/>
-          <a:p>
-            <a:r>
-              <a:rPr lang="en-US" dirty="0"/>
-              <a:t>We are working as consultants to the Pan American Health Organization on the evaluation of PCVs in Latin America</a:t>
-            </a:r>
-          </a:p>
-          <a:p>
-            <a:r>
-              <a:rPr lang="en-US" dirty="0"/>
-              <a:t>We are expected to present the findings of our analyses to different stakeholders</a:t>
-            </a:r>
-          </a:p>
-        </p:txBody>
-      </p:sp>
-    </p:spTree>
-    <p:extLst>
-      <p:ext uri="{BB962C8B-B14F-4D97-AF65-F5344CB8AC3E}">
-        <p14:creationId xmlns:p14="http://schemas.microsoft.com/office/powerpoint/2010/main" val="6950136"/>
-      </p:ext>
-    </p:extLst>
-  </p:cSld>
-  <p:clrMapOvr>
-    <a:masterClrMapping/>
-  </p:clrMapOvr>
-</p:sld>
-</file>
-
-<file path=ppt/slides/slide19.xml><?xml version="1.0" encoding="utf-8"?>
+<file path=ppt/slides/slide15.xml><?xml version="1.0" encoding="utf-8"?>
 <p:sld xmlns:a="http://schemas.openxmlformats.org/drawingml/2006/main" xmlns:r="http://schemas.openxmlformats.org/officeDocument/2006/relationships" xmlns:p="http://schemas.openxmlformats.org/presentationml/2006/main">
   <p:cSld>
     <p:spTree>
@@ -7410,7 +6852,7 @@
           <p:cNvPr id="2" name="Title 1">
             <a:extLst>
               <a:ext uri="{FF2B5EF4-FFF2-40B4-BE49-F238E27FC236}">
-                <a16:creationId xmlns:a16="http://schemas.microsoft.com/office/drawing/2014/main" id="{2ECC60CB-6EED-40B5-B81D-0D051E7453F9}"/>
+                <a16:creationId xmlns:a16="http://schemas.microsoft.com/office/drawing/2014/main" id="{4C657FBB-3D41-45BB-A04E-750975F0AEC8}"/>
               </a:ext>
             </a:extLst>
           </p:cNvPr>
@@ -7428,7 +6870,7 @@
           <a:p>
             <a:r>
               <a:rPr lang="en-US" dirty="0"/>
-              <a:t>Format for today</a:t>
+              <a:t>Outline for this presentation</a:t>
             </a:r>
           </a:p>
         </p:txBody>
@@ -7438,7 +6880,7 @@
           <p:cNvPr id="3" name="Content Placeholder 2">
             <a:extLst>
               <a:ext uri="{FF2B5EF4-FFF2-40B4-BE49-F238E27FC236}">
-                <a16:creationId xmlns:a16="http://schemas.microsoft.com/office/drawing/2014/main" id="{4777A6E2-484B-49FA-B0B4-C56DD7AAE53D}"/>
+                <a16:creationId xmlns:a16="http://schemas.microsoft.com/office/drawing/2014/main" id="{B73D5587-003E-4172-B43D-7B0D818D3B65}"/>
               </a:ext>
             </a:extLst>
           </p:cNvPr>
@@ -7456,288 +6898,30 @@
           <a:p>
             <a:r>
               <a:rPr lang="en-US" dirty="0"/>
-              <a:t>Some general comments on data visualization</a:t>
+              <a:t>Making nicer plots</a:t>
             </a:r>
           </a:p>
           <a:p>
             <a:r>
               <a:rPr lang="en-US" dirty="0"/>
-              <a:t>30 min: Huddle with groups to summarize findings, answer questions posed on next slide</a:t>
+              <a:t>Managing uncertainty in your results</a:t>
             </a:r>
           </a:p>
           <a:p>
             <a:r>
               <a:rPr lang="en-US" dirty="0"/>
-              <a:t>5 min “Chalk talk” presentation by group</a:t>
-            </a:r>
+              <a:t>What results should you show, and to whom?</a:t>
+            </a:r>
+          </a:p>
+          <a:p>
+            <a:endParaRPr lang="en-US" dirty="0"/>
           </a:p>
         </p:txBody>
       </p:sp>
     </p:spTree>
     <p:extLst>
       <p:ext uri="{BB962C8B-B14F-4D97-AF65-F5344CB8AC3E}">
-        <p14:creationId xmlns:p14="http://schemas.microsoft.com/office/powerpoint/2010/main" val="2711751993"/>
-      </p:ext>
-    </p:extLst>
-  </p:cSld>
-  <p:clrMapOvr>
-    <a:masterClrMapping/>
-  </p:clrMapOvr>
-</p:sld>
-</file>
-
-<file path=ppt/slides/slide20.xml><?xml version="1.0" encoding="utf-8"?>
-<p:sld xmlns:a="http://schemas.openxmlformats.org/drawingml/2006/main" xmlns:r="http://schemas.openxmlformats.org/officeDocument/2006/relationships" xmlns:p="http://schemas.openxmlformats.org/presentationml/2006/main">
-  <p:cSld>
-    <p:spTree>
-      <p:nvGrpSpPr>
-        <p:cNvPr id="1" name=""/>
-        <p:cNvGrpSpPr/>
-        <p:nvPr/>
-      </p:nvGrpSpPr>
-      <p:grpSpPr>
-        <a:xfrm>
-          <a:off x="0" y="0"/>
-          <a:ext cx="0" cy="0"/>
-          <a:chOff x="0" y="0"/>
-          <a:chExt cx="0" cy="0"/>
-        </a:xfrm>
-      </p:grpSpPr>
-      <p:sp>
-        <p:nvSpPr>
-          <p:cNvPr id="2" name="Title 1">
-            <a:extLst>
-              <a:ext uri="{FF2B5EF4-FFF2-40B4-BE49-F238E27FC236}">
-                <a16:creationId xmlns:a16="http://schemas.microsoft.com/office/drawing/2014/main" id="{0BEA7603-81E0-4D51-BA53-03B072E1367C}"/>
-              </a:ext>
-            </a:extLst>
-          </p:cNvPr>
-          <p:cNvSpPr>
-            <a:spLocks noGrp="1"/>
-          </p:cNvSpPr>
-          <p:nvPr>
-            <p:ph type="title"/>
-          </p:nvPr>
-        </p:nvSpPr>
-        <p:spPr/>
-        <p:txBody>
-          <a:bodyPr/>
-          <a:lstStyle/>
-          <a:p>
-            <a:r>
-              <a:rPr lang="en-US" dirty="0"/>
-              <a:t>6 groups for today. Presenting to:</a:t>
-            </a:r>
-          </a:p>
-        </p:txBody>
-      </p:sp>
-      <p:sp>
-        <p:nvSpPr>
-          <p:cNvPr id="3" name="Content Placeholder 2">
-            <a:extLst>
-              <a:ext uri="{FF2B5EF4-FFF2-40B4-BE49-F238E27FC236}">
-                <a16:creationId xmlns:a16="http://schemas.microsoft.com/office/drawing/2014/main" id="{1BB32E79-3740-4703-B9AA-26F5E064B14D}"/>
-              </a:ext>
-            </a:extLst>
-          </p:cNvPr>
-          <p:cNvSpPr>
-            <a:spLocks noGrp="1"/>
-          </p:cNvSpPr>
-          <p:nvPr>
-            <p:ph idx="1"/>
-          </p:nvPr>
-        </p:nvSpPr>
-        <p:spPr>
-          <a:xfrm>
-            <a:off x="703317" y="1752600"/>
-            <a:ext cx="10871200" cy="3124199"/>
-          </a:xfrm>
-        </p:spPr>
-        <p:txBody>
-          <a:bodyPr/>
-          <a:lstStyle/>
-          <a:p>
-            <a:r>
-              <a:rPr lang="en-US" dirty="0"/>
-              <a:t>Brazilian Ministry of Health (higher-ups)</a:t>
-            </a:r>
-          </a:p>
-          <a:p>
-            <a:r>
-              <a:rPr lang="en-US" dirty="0"/>
-              <a:t>Brazilian Ministry of Finance (higher-ups)</a:t>
-            </a:r>
-          </a:p>
-          <a:p>
-            <a:r>
-              <a:rPr lang="en-US"/>
-              <a:t>Field epidemiologists in </a:t>
-            </a:r>
-            <a:r>
-              <a:rPr lang="en-US" dirty="0"/>
-              <a:t>Ministry of Health</a:t>
-            </a:r>
-          </a:p>
-          <a:p>
-            <a:r>
-              <a:rPr lang="en-US" dirty="0"/>
-              <a:t>Gates Foundation </a:t>
-            </a:r>
-          </a:p>
-          <a:p>
-            <a:r>
-              <a:rPr lang="en-US" dirty="0"/>
-              <a:t>PAHO/WHO </a:t>
-            </a:r>
-          </a:p>
-          <a:p>
-            <a:r>
-              <a:rPr lang="en-US" dirty="0"/>
-              <a:t>National Immunization Technical Advisory Groups (NITAG)</a:t>
-            </a:r>
-          </a:p>
-        </p:txBody>
-      </p:sp>
-    </p:spTree>
-    <p:extLst>
-      <p:ext uri="{BB962C8B-B14F-4D97-AF65-F5344CB8AC3E}">
-        <p14:creationId xmlns:p14="http://schemas.microsoft.com/office/powerpoint/2010/main" val="4289919929"/>
-      </p:ext>
-    </p:extLst>
-  </p:cSld>
-  <p:clrMapOvr>
-    <a:masterClrMapping/>
-  </p:clrMapOvr>
-</p:sld>
-</file>
-
-<file path=ppt/slides/slide21.xml><?xml version="1.0" encoding="utf-8"?>
-<p:sld xmlns:a="http://schemas.openxmlformats.org/drawingml/2006/main" xmlns:r="http://schemas.openxmlformats.org/officeDocument/2006/relationships" xmlns:p="http://schemas.openxmlformats.org/presentationml/2006/main">
-  <p:cSld>
-    <p:spTree>
-      <p:nvGrpSpPr>
-        <p:cNvPr id="1" name=""/>
-        <p:cNvGrpSpPr/>
-        <p:nvPr/>
-      </p:nvGrpSpPr>
-      <p:grpSpPr>
-        <a:xfrm>
-          <a:off x="0" y="0"/>
-          <a:ext cx="0" cy="0"/>
-          <a:chOff x="0" y="0"/>
-          <a:chExt cx="0" cy="0"/>
-        </a:xfrm>
-      </p:grpSpPr>
-      <p:sp>
-        <p:nvSpPr>
-          <p:cNvPr id="2" name="Title 1">
-            <a:extLst>
-              <a:ext uri="{FF2B5EF4-FFF2-40B4-BE49-F238E27FC236}">
-                <a16:creationId xmlns:a16="http://schemas.microsoft.com/office/drawing/2014/main" id="{00F26181-69D8-47A6-B763-D4C0ECC05D98}"/>
-              </a:ext>
-            </a:extLst>
-          </p:cNvPr>
-          <p:cNvSpPr>
-            <a:spLocks noGrp="1"/>
-          </p:cNvSpPr>
-          <p:nvPr>
-            <p:ph type="title"/>
-          </p:nvPr>
-        </p:nvSpPr>
-        <p:spPr/>
-        <p:txBody>
-          <a:bodyPr/>
-          <a:lstStyle/>
-          <a:p>
-            <a:r>
-              <a:rPr lang="en-US" dirty="0"/>
-              <a:t>Today’s task</a:t>
-            </a:r>
-          </a:p>
-        </p:txBody>
-      </p:sp>
-      <p:sp>
-        <p:nvSpPr>
-          <p:cNvPr id="3" name="Content Placeholder 2">
-            <a:extLst>
-              <a:ext uri="{FF2B5EF4-FFF2-40B4-BE49-F238E27FC236}">
-                <a16:creationId xmlns:a16="http://schemas.microsoft.com/office/drawing/2014/main" id="{D220B53F-CF91-4972-A67C-39FF67609B4E}"/>
-              </a:ext>
-            </a:extLst>
-          </p:cNvPr>
-          <p:cNvSpPr>
-            <a:spLocks noGrp="1"/>
-          </p:cNvSpPr>
-          <p:nvPr>
-            <p:ph idx="1"/>
-          </p:nvPr>
-        </p:nvSpPr>
-        <p:spPr>
-          <a:xfrm>
-            <a:off x="711200" y="1752600"/>
-            <a:ext cx="10871200" cy="4144963"/>
-          </a:xfrm>
-        </p:spPr>
-        <p:txBody>
-          <a:bodyPr/>
-          <a:lstStyle/>
-          <a:p>
-            <a:r>
-              <a:rPr lang="en-US" dirty="0"/>
-              <a:t>30 minutes: huddle with your groups to discuss:</a:t>
-            </a:r>
-          </a:p>
-          <a:p>
-            <a:pPr marL="0" indent="0">
-              <a:buNone/>
-            </a:pPr>
-            <a:r>
-              <a:rPr lang="en-US" dirty="0"/>
-              <a:t>	1) What does your stakeholder most want to know?</a:t>
-            </a:r>
-          </a:p>
-          <a:p>
-            <a:pPr marL="0" indent="0">
-              <a:buNone/>
-            </a:pPr>
-            <a:r>
-              <a:rPr lang="en-US" dirty="0"/>
-              <a:t>	2) Which analyses and sets of results will you present? 			2a) How much do the results depend on the 				method used for analysis?</a:t>
-            </a:r>
-          </a:p>
-          <a:p>
-            <a:pPr marL="0" indent="0">
-              <a:buNone/>
-            </a:pPr>
-            <a:r>
-              <a:rPr lang="en-US" dirty="0"/>
-              <a:t>	3) How can you best summarize the findings in a single 			plot?</a:t>
-            </a:r>
-          </a:p>
-          <a:p>
-            <a:pPr marL="0" indent="0">
-              <a:buNone/>
-            </a:pPr>
-            <a:r>
-              <a:rPr lang="en-US" dirty="0"/>
-              <a:t>	4) What is going to be your final estimate for vaccine </a:t>
-            </a:r>
-          </a:p>
-          <a:p>
-            <a:pPr marL="0" indent="0">
-              <a:buNone/>
-            </a:pPr>
-            <a:r>
-              <a:rPr lang="en-US" dirty="0"/>
-              <a:t>		effect?</a:t>
-            </a:r>
-          </a:p>
-        </p:txBody>
-      </p:sp>
-    </p:spTree>
-    <p:extLst>
-      <p:ext uri="{BB962C8B-B14F-4D97-AF65-F5344CB8AC3E}">
-        <p14:creationId xmlns:p14="http://schemas.microsoft.com/office/powerpoint/2010/main" val="3293502148"/>
+        <p14:creationId xmlns:p14="http://schemas.microsoft.com/office/powerpoint/2010/main" val="1552394402"/>
       </p:ext>
     </p:extLst>
   </p:cSld>
@@ -7769,7 +6953,7 @@
           <p:cNvPr id="2" name="Title 1">
             <a:extLst>
               <a:ext uri="{FF2B5EF4-FFF2-40B4-BE49-F238E27FC236}">
-                <a16:creationId xmlns:a16="http://schemas.microsoft.com/office/drawing/2014/main" id="{C4A9464D-0607-4AFD-8FBA-6315B1B5A5BA}"/>
+                <a16:creationId xmlns:a16="http://schemas.microsoft.com/office/drawing/2014/main" id="{81D2EB5D-68DA-46E6-9777-E471800FBC4F}"/>
               </a:ext>
             </a:extLst>
           </p:cNvPr>
@@ -7782,7 +6966,7 @@
         </p:nvSpPr>
         <p:spPr>
           <a:xfrm>
-            <a:off x="697149" y="611312"/>
+            <a:off x="609600" y="533400"/>
             <a:ext cx="10972800" cy="1143000"/>
           </a:xfrm>
         </p:spPr>
@@ -7792,17 +6976,91 @@
           <a:p>
             <a:r>
               <a:rPr lang="en-US" dirty="0"/>
-              <a:t>Data viz</a:t>
+              <a:t>Plotting tips</a:t>
+            </a:r>
+          </a:p>
+        </p:txBody>
+      </p:sp>
+      <p:sp>
+        <p:nvSpPr>
+          <p:cNvPr id="5" name="Rectangle 4">
+            <a:extLst>
+              <a:ext uri="{FF2B5EF4-FFF2-40B4-BE49-F238E27FC236}">
+                <a16:creationId xmlns:a16="http://schemas.microsoft.com/office/drawing/2014/main" id="{04107DD3-8E90-49C2-AE3E-22927FEA4D9C}"/>
+              </a:ext>
+            </a:extLst>
+          </p:cNvPr>
+          <p:cNvSpPr/>
+          <p:nvPr/>
+        </p:nvSpPr>
+        <p:spPr>
+          <a:xfrm>
+            <a:off x="228600" y="5913888"/>
+            <a:ext cx="6096000" cy="923330"/>
+          </a:xfrm>
+          <a:prstGeom prst="rect">
+            <a:avLst/>
+          </a:prstGeom>
+        </p:spPr>
+        <p:txBody>
+          <a:bodyPr>
+            <a:spAutoFit/>
+          </a:bodyPr>
+          <a:lstStyle/>
+          <a:p>
+            <a:r>
+              <a:rPr lang="en-US" dirty="0"/>
+              <a:t>(par(</a:t>
+            </a:r>
+            <a:r>
+              <a:rPr lang="en-US" dirty="0" err="1"/>
+              <a:t>bg</a:t>
+            </a:r>
+            <a:r>
+              <a:rPr lang="en-US" dirty="0"/>
+              <a:t> = 'gray'))</a:t>
+            </a:r>
+          </a:p>
+          <a:p>
+            <a:r>
+              <a:rPr lang="en-US" dirty="0"/>
+              <a:t>plot(d1$J12_18, type=‘l’, </a:t>
+            </a:r>
+            <a:r>
+              <a:rPr lang="en-US" dirty="0" err="1"/>
+              <a:t>lwd</a:t>
+            </a:r>
+            <a:r>
+              <a:rPr lang="en-US" dirty="0"/>
+              <a:t>=2)</a:t>
+            </a:r>
+          </a:p>
+          <a:p>
+            <a:r>
+              <a:rPr lang="en-US" dirty="0" err="1"/>
+              <a:t>abline</a:t>
+            </a:r>
+            <a:r>
+              <a:rPr lang="en-US" dirty="0"/>
+              <a:t>(h=</a:t>
+            </a:r>
+            <a:r>
+              <a:rPr lang="en-US" dirty="0" err="1"/>
+              <a:t>seq</a:t>
+            </a:r>
+            <a:r>
+              <a:rPr lang="en-US" dirty="0"/>
+              <a:t>(from=6000,to=20000, by=2000), col='white')</a:t>
             </a:r>
           </a:p>
         </p:txBody>
       </p:sp>
       <p:pic>
         <p:nvPicPr>
-          <p:cNvPr id="4" name="Picture 3">
+          <p:cNvPr id="8" name="Picture 7">
             <a:extLst>
               <a:ext uri="{FF2B5EF4-FFF2-40B4-BE49-F238E27FC236}">
-                <a16:creationId xmlns:a16="http://schemas.microsoft.com/office/drawing/2014/main" id="{06FFE308-D9E8-4FBD-A2DD-C2DC7FDF239A}"/>
+                <a16:creationId xmlns:a16="http://schemas.microsoft.com/office/drawing/2014/main" id="{E2F5F378-6166-4F06-8933-0391E8E64142}"/>
               </a:ext>
             </a:extLst>
           </p:cNvPr>
@@ -7819,61 +7077,18 @@
         </p:blipFill>
         <p:spPr>
           <a:xfrm>
-            <a:off x="4114800" y="1600200"/>
-            <a:ext cx="4137498" cy="5181600"/>
+            <a:off x="4191000" y="1828800"/>
+            <a:ext cx="3752381" cy="3580952"/>
           </a:xfrm>
           <a:prstGeom prst="rect">
             <a:avLst/>
           </a:prstGeom>
         </p:spPr>
       </p:pic>
-      <p:sp>
-        <p:nvSpPr>
-          <p:cNvPr id="3" name="TextBox 2">
-            <a:extLst>
-              <a:ext uri="{FF2B5EF4-FFF2-40B4-BE49-F238E27FC236}">
-                <a16:creationId xmlns:a16="http://schemas.microsoft.com/office/drawing/2014/main" id="{55B16279-37E9-4096-852C-84A1035FCE11}"/>
-              </a:ext>
-            </a:extLst>
-          </p:cNvPr>
-          <p:cNvSpPr txBox="1"/>
-          <p:nvPr/>
-        </p:nvSpPr>
-        <p:spPr>
-          <a:xfrm>
-            <a:off x="381000" y="3200400"/>
-            <a:ext cx="3365024" cy="369332"/>
-          </a:xfrm>
-          <a:prstGeom prst="rect">
-            <a:avLst/>
-          </a:prstGeom>
-          <a:noFill/>
-        </p:spPr>
-        <p:txBody>
-          <a:bodyPr wrap="none" rtlCol="0">
-            <a:spAutoFit/>
-          </a:bodyPr>
-          <a:lstStyle/>
-          <a:p>
-            <a:r>
-              <a:rPr lang="en-US" dirty="0"/>
-              <a:t>Remember the “</a:t>
-            </a:r>
-            <a:r>
-              <a:rPr lang="en-US" dirty="0" err="1"/>
-              <a:t>Data:Ink</a:t>
-            </a:r>
-            <a:r>
-              <a:rPr lang="en-US" dirty="0"/>
-              <a:t>” ratio!</a:t>
-            </a:r>
-          </a:p>
-        </p:txBody>
-      </p:sp>
     </p:spTree>
     <p:extLst>
       <p:ext uri="{BB962C8B-B14F-4D97-AF65-F5344CB8AC3E}">
-        <p14:creationId xmlns:p14="http://schemas.microsoft.com/office/powerpoint/2010/main" val="3692831007"/>
+        <p14:creationId xmlns:p14="http://schemas.microsoft.com/office/powerpoint/2010/main" val="3343027262"/>
       </p:ext>
     </p:extLst>
   </p:cSld>
@@ -7902,43 +7117,10 @@
       </p:grpSpPr>
       <p:sp>
         <p:nvSpPr>
-          <p:cNvPr id="2" name="Title 1">
-            <a:extLst>
-              <a:ext uri="{FF2B5EF4-FFF2-40B4-BE49-F238E27FC236}">
-                <a16:creationId xmlns:a16="http://schemas.microsoft.com/office/drawing/2014/main" id="{81D2EB5D-68DA-46E6-9777-E471800FBC4F}"/>
-              </a:ext>
-            </a:extLst>
-          </p:cNvPr>
-          <p:cNvSpPr>
-            <a:spLocks noGrp="1"/>
-          </p:cNvSpPr>
-          <p:nvPr>
-            <p:ph type="title"/>
-          </p:nvPr>
-        </p:nvSpPr>
-        <p:spPr>
-          <a:xfrm>
-            <a:off x="609600" y="533400"/>
-            <a:ext cx="10972800" cy="1143000"/>
-          </a:xfrm>
-        </p:spPr>
-        <p:txBody>
-          <a:bodyPr/>
-          <a:lstStyle/>
-          <a:p>
-            <a:r>
-              <a:rPr lang="en-US" dirty="0"/>
-              <a:t>Plotting tips</a:t>
-            </a:r>
-          </a:p>
-        </p:txBody>
-      </p:sp>
-      <p:sp>
-        <p:nvSpPr>
           <p:cNvPr id="5" name="Rectangle 4">
             <a:extLst>
               <a:ext uri="{FF2B5EF4-FFF2-40B4-BE49-F238E27FC236}">
-                <a16:creationId xmlns:a16="http://schemas.microsoft.com/office/drawing/2014/main" id="{04107DD3-8E90-49C2-AE3E-22927FEA4D9C}"/>
+                <a16:creationId xmlns:a16="http://schemas.microsoft.com/office/drawing/2014/main" id="{1B4FECCA-96CF-4B2B-8CF9-C59486D7A84A}"/>
               </a:ext>
             </a:extLst>
           </p:cNvPr>
@@ -7947,7 +7129,7 @@
         </p:nvSpPr>
         <p:spPr>
           <a:xfrm>
-            <a:off x="228600" y="5913888"/>
+            <a:off x="711200" y="5740700"/>
             <a:ext cx="6096000" cy="923330"/>
           </a:xfrm>
           <a:prstGeom prst="rect">
@@ -7970,21 +7152,13 @@
             </a:r>
             <a:r>
               <a:rPr lang="en-US" dirty="0"/>
-              <a:t> = 'gray'))</a:t>
+              <a:t> = 'white'))</a:t>
             </a:r>
           </a:p>
           <a:p>
             <a:r>
               <a:rPr lang="en-US" dirty="0"/>
-              <a:t>plot(d1$J12_18, type=‘l’, </a:t>
-            </a:r>
-            <a:r>
-              <a:rPr lang="en-US" dirty="0" err="1"/>
-              <a:t>lwd</a:t>
-            </a:r>
-            <a:r>
-              <a:rPr lang="en-US" dirty="0"/>
-              <a:t>=2)</a:t>
+              <a:t>plot(d1$J12_18, type='l')</a:t>
             </a:r>
           </a:p>
           <a:p>
@@ -8002,17 +7176,17 @@
             </a:r>
             <a:r>
               <a:rPr lang="en-US" dirty="0"/>
-              <a:t>(from=6000,to=20000, by=2000), col='white')</a:t>
+              <a:t>(from=6000,to=20000, by=2000), col='black')</a:t>
             </a:r>
           </a:p>
         </p:txBody>
       </p:sp>
       <p:pic>
         <p:nvPicPr>
-          <p:cNvPr id="8" name="Picture 7">
+          <p:cNvPr id="6" name="Picture 5">
             <a:extLst>
               <a:ext uri="{FF2B5EF4-FFF2-40B4-BE49-F238E27FC236}">
-                <a16:creationId xmlns:a16="http://schemas.microsoft.com/office/drawing/2014/main" id="{E2F5F378-6166-4F06-8933-0391E8E64142}"/>
+                <a16:creationId xmlns:a16="http://schemas.microsoft.com/office/drawing/2014/main" id="{902C5A47-965D-4DC2-9918-FFE28FCF8A00}"/>
               </a:ext>
             </a:extLst>
           </p:cNvPr>
@@ -8029,7 +7203,7 @@
         </p:blipFill>
         <p:spPr>
           <a:xfrm>
-            <a:off x="4191000" y="1828800"/>
+            <a:off x="4219809" y="1828800"/>
             <a:ext cx="3752381" cy="3580952"/>
           </a:xfrm>
           <a:prstGeom prst="rect">
@@ -8037,10 +7211,43 @@
           </a:prstGeom>
         </p:spPr>
       </p:pic>
+      <p:sp>
+        <p:nvSpPr>
+          <p:cNvPr id="7" name="Title 1">
+            <a:extLst>
+              <a:ext uri="{FF2B5EF4-FFF2-40B4-BE49-F238E27FC236}">
+                <a16:creationId xmlns:a16="http://schemas.microsoft.com/office/drawing/2014/main" id="{3D48FB59-E672-4C2E-B304-E95DF62EC326}"/>
+              </a:ext>
+            </a:extLst>
+          </p:cNvPr>
+          <p:cNvSpPr>
+            <a:spLocks noGrp="1"/>
+          </p:cNvSpPr>
+          <p:nvPr>
+            <p:ph type="title"/>
+          </p:nvPr>
+        </p:nvSpPr>
+        <p:spPr>
+          <a:xfrm>
+            <a:off x="637309" y="790938"/>
+            <a:ext cx="10972800" cy="1143000"/>
+          </a:xfrm>
+        </p:spPr>
+        <p:txBody>
+          <a:bodyPr/>
+          <a:lstStyle/>
+          <a:p>
+            <a:r>
+              <a:rPr lang="en-US" dirty="0"/>
+              <a:t>Get rid of gray background</a:t>
+            </a:r>
+          </a:p>
+        </p:txBody>
+      </p:sp>
     </p:spTree>
     <p:extLst>
       <p:ext uri="{BB962C8B-B14F-4D97-AF65-F5344CB8AC3E}">
-        <p14:creationId xmlns:p14="http://schemas.microsoft.com/office/powerpoint/2010/main" val="3343027262"/>
+        <p14:creationId xmlns:p14="http://schemas.microsoft.com/office/powerpoint/2010/main" val="2603581265"/>
       </p:ext>
     </p:extLst>
   </p:cSld>
@@ -8069,76 +7276,80 @@
       </p:grpSpPr>
       <p:sp>
         <p:nvSpPr>
-          <p:cNvPr id="5" name="Rectangle 4">
+          <p:cNvPr id="2" name="Title 1">
             <a:extLst>
               <a:ext uri="{FF2B5EF4-FFF2-40B4-BE49-F238E27FC236}">
-                <a16:creationId xmlns:a16="http://schemas.microsoft.com/office/drawing/2014/main" id="{1B4FECCA-96CF-4B2B-8CF9-C59486D7A84A}"/>
+                <a16:creationId xmlns:a16="http://schemas.microsoft.com/office/drawing/2014/main" id="{629B8C56-10F6-41A5-9C95-FFDCB7CBA9DF}"/>
               </a:ext>
             </a:extLst>
           </p:cNvPr>
-          <p:cNvSpPr/>
-          <p:nvPr/>
+          <p:cNvSpPr>
+            <a:spLocks noGrp="1"/>
+          </p:cNvSpPr>
+          <p:nvPr>
+            <p:ph type="title"/>
+          </p:nvPr>
         </p:nvSpPr>
         <p:spPr>
           <a:xfrm>
-            <a:off x="711200" y="5740700"/>
-            <a:ext cx="6096000" cy="923330"/>
-          </a:xfrm>
-          <a:prstGeom prst="rect">
-            <a:avLst/>
-          </a:prstGeom>
+            <a:off x="623454" y="721664"/>
+            <a:ext cx="10972800" cy="1143000"/>
+          </a:xfrm>
         </p:spPr>
         <p:txBody>
-          <a:bodyPr>
-            <a:spAutoFit/>
-          </a:bodyPr>
+          <a:bodyPr/>
           <a:lstStyle/>
           <a:p>
             <a:r>
               <a:rPr lang="en-US" dirty="0"/>
-              <a:t>(par(</a:t>
-            </a:r>
-            <a:r>
-              <a:rPr lang="en-US" dirty="0" err="1"/>
-              <a:t>bg</a:t>
-            </a:r>
-            <a:r>
+              <a:t>Get rid of horizontal guidelines</a:t>
+            </a:r>
+            <a:br>
               <a:rPr lang="en-US" dirty="0"/>
-              <a:t> = 'white'))</a:t>
-            </a:r>
-          </a:p>
-          <a:p>
+            </a:br>
             <a:r>
               <a:rPr lang="en-US" dirty="0"/>
-              <a:t>plot(d1$J12_18, type='l')</a:t>
-            </a:r>
-          </a:p>
-          <a:p>
-            <a:r>
-              <a:rPr lang="en-US" dirty="0" err="1"/>
-              <a:t>abline</a:t>
-            </a:r>
-            <a:r>
-              <a:rPr lang="en-US" dirty="0"/>
-              <a:t>(h=</a:t>
-            </a:r>
-            <a:r>
-              <a:rPr lang="en-US" dirty="0" err="1"/>
-              <a:t>seq</a:t>
-            </a:r>
-            <a:r>
-              <a:rPr lang="en-US" dirty="0"/>
-              <a:t>(from=6000,to=20000, by=2000), col='black')</a:t>
-            </a:r>
+              <a:t>“Chart junk”</a:t>
+            </a:r>
+          </a:p>
+        </p:txBody>
+      </p:sp>
+      <p:sp>
+        <p:nvSpPr>
+          <p:cNvPr id="3" name="Content Placeholder 2">
+            <a:extLst>
+              <a:ext uri="{FF2B5EF4-FFF2-40B4-BE49-F238E27FC236}">
+                <a16:creationId xmlns:a16="http://schemas.microsoft.com/office/drawing/2014/main" id="{FFF677C3-62B7-4470-944F-B714EC324D24}"/>
+              </a:ext>
+            </a:extLst>
+          </p:cNvPr>
+          <p:cNvSpPr>
+            <a:spLocks noGrp="1"/>
+          </p:cNvSpPr>
+          <p:nvPr>
+            <p:ph idx="1"/>
+          </p:nvPr>
+        </p:nvSpPr>
+        <p:spPr>
+          <a:xfrm>
+            <a:off x="725054" y="2145001"/>
+            <a:ext cx="10871200" cy="4144963"/>
+          </a:xfrm>
+        </p:spPr>
+        <p:txBody>
+          <a:bodyPr/>
+          <a:lstStyle/>
+          <a:p>
+            <a:endParaRPr lang="en-US"/>
           </a:p>
         </p:txBody>
       </p:sp>
       <p:pic>
         <p:nvPicPr>
-          <p:cNvPr id="6" name="Picture 5">
+          <p:cNvPr id="4" name="Picture 3">
             <a:extLst>
               <a:ext uri="{FF2B5EF4-FFF2-40B4-BE49-F238E27FC236}">
-                <a16:creationId xmlns:a16="http://schemas.microsoft.com/office/drawing/2014/main" id="{902C5A47-965D-4DC2-9918-FFE28FCF8A00}"/>
+                <a16:creationId xmlns:a16="http://schemas.microsoft.com/office/drawing/2014/main" id="{E3E10157-005B-4319-9A10-9626E76FCB99}"/>
               </a:ext>
             </a:extLst>
           </p:cNvPr>
@@ -8155,7 +7366,7 @@
         </p:blipFill>
         <p:spPr>
           <a:xfrm>
-            <a:off x="4219809" y="1828800"/>
+            <a:off x="4114800" y="1864664"/>
             <a:ext cx="3752381" cy="3580952"/>
           </a:xfrm>
           <a:prstGeom prst="rect">
@@ -8165,33 +7376,34 @@
       </p:pic>
       <p:sp>
         <p:nvSpPr>
-          <p:cNvPr id="7" name="Title 1">
+          <p:cNvPr id="5" name="Rectangle 4">
             <a:extLst>
               <a:ext uri="{FF2B5EF4-FFF2-40B4-BE49-F238E27FC236}">
-                <a16:creationId xmlns:a16="http://schemas.microsoft.com/office/drawing/2014/main" id="{3D48FB59-E672-4C2E-B304-E95DF62EC326}"/>
+                <a16:creationId xmlns:a16="http://schemas.microsoft.com/office/drawing/2014/main" id="{721D33A1-DD50-4323-BB4F-BDEB3EA09031}"/>
               </a:ext>
             </a:extLst>
           </p:cNvPr>
-          <p:cNvSpPr>
-            <a:spLocks noGrp="1"/>
-          </p:cNvSpPr>
-          <p:nvPr>
-            <p:ph type="title"/>
-          </p:nvPr>
+          <p:cNvSpPr/>
+          <p:nvPr/>
         </p:nvSpPr>
         <p:spPr>
           <a:xfrm>
-            <a:off x="637309" y="790938"/>
-            <a:ext cx="10972800" cy="1143000"/>
-          </a:xfrm>
+            <a:off x="76200" y="6324600"/>
+            <a:ext cx="2688557" cy="369332"/>
+          </a:xfrm>
+          <a:prstGeom prst="rect">
+            <a:avLst/>
+          </a:prstGeom>
         </p:spPr>
         <p:txBody>
-          <a:bodyPr/>
+          <a:bodyPr wrap="none">
+            <a:spAutoFit/>
+          </a:bodyPr>
           <a:lstStyle/>
           <a:p>
             <a:r>
               <a:rPr lang="en-US" dirty="0"/>
-              <a:t>Get rid of gray background</a:t>
+              <a:t>plot(d1$J12_18, type='l')</a:t>
             </a:r>
           </a:p>
         </p:txBody>
@@ -8199,7 +7411,7 @@
     </p:spTree>
     <p:extLst>
       <p:ext uri="{BB962C8B-B14F-4D97-AF65-F5344CB8AC3E}">
-        <p14:creationId xmlns:p14="http://schemas.microsoft.com/office/powerpoint/2010/main" val="2603581265"/>
+        <p14:creationId xmlns:p14="http://schemas.microsoft.com/office/powerpoint/2010/main" val="2190071954"/>
       </p:ext>
     </p:extLst>
   </p:cSld>
@@ -8231,7 +7443,7 @@
           <p:cNvPr id="2" name="Title 1">
             <a:extLst>
               <a:ext uri="{FF2B5EF4-FFF2-40B4-BE49-F238E27FC236}">
-                <a16:creationId xmlns:a16="http://schemas.microsoft.com/office/drawing/2014/main" id="{629B8C56-10F6-41A5-9C95-FFDCB7CBA9DF}"/>
+                <a16:creationId xmlns:a16="http://schemas.microsoft.com/office/drawing/2014/main" id="{C706FDAF-53B9-4383-8070-028AA792A831}"/>
               </a:ext>
             </a:extLst>
           </p:cNvPr>
@@ -8242,26 +7454,14 @@
             <p:ph type="title"/>
           </p:nvPr>
         </p:nvSpPr>
-        <p:spPr>
-          <a:xfrm>
-            <a:off x="623454" y="721664"/>
-            <a:ext cx="10972800" cy="1143000"/>
-          </a:xfrm>
-        </p:spPr>
+        <p:spPr/>
         <p:txBody>
           <a:bodyPr/>
           <a:lstStyle/>
           <a:p>
             <a:r>
               <a:rPr lang="en-US" dirty="0"/>
-              <a:t>Get rid of horizontal guidelines</a:t>
-            </a:r>
-            <a:br>
-              <a:rPr lang="en-US" dirty="0"/>
-            </a:br>
-            <a:r>
-              <a:rPr lang="en-US" dirty="0"/>
-              <a:t>“Chart junk”</a:t>
+              <a:t>Extend y axis to 0</a:t>
             </a:r>
           </a:p>
         </p:txBody>
@@ -8271,7 +7471,7 @@
           <p:cNvPr id="3" name="Content Placeholder 2">
             <a:extLst>
               <a:ext uri="{FF2B5EF4-FFF2-40B4-BE49-F238E27FC236}">
-                <a16:creationId xmlns:a16="http://schemas.microsoft.com/office/drawing/2014/main" id="{FFF677C3-62B7-4470-944F-B714EC324D24}"/>
+                <a16:creationId xmlns:a16="http://schemas.microsoft.com/office/drawing/2014/main" id="{D5EFD609-3AD1-432C-AC50-AD47028C8A33}"/>
               </a:ext>
             </a:extLst>
           </p:cNvPr>
@@ -8282,12 +7482,7 @@
             <p:ph idx="1"/>
           </p:nvPr>
         </p:nvSpPr>
-        <p:spPr>
-          <a:xfrm>
-            <a:off x="725054" y="2145001"/>
-            <a:ext cx="10871200" cy="4144963"/>
-          </a:xfrm>
-        </p:spPr>
+        <p:spPr/>
         <p:txBody>
           <a:bodyPr/>
           <a:lstStyle/>
@@ -8296,12 +7491,62 @@
           </a:p>
         </p:txBody>
       </p:sp>
+      <p:sp>
+        <p:nvSpPr>
+          <p:cNvPr id="5" name="Rectangle 4">
+            <a:extLst>
+              <a:ext uri="{FF2B5EF4-FFF2-40B4-BE49-F238E27FC236}">
+                <a16:creationId xmlns:a16="http://schemas.microsoft.com/office/drawing/2014/main" id="{B593BBD2-60F6-4A89-83A5-ED2EF63E3F30}"/>
+              </a:ext>
+            </a:extLst>
+          </p:cNvPr>
+          <p:cNvSpPr/>
+          <p:nvPr/>
+        </p:nvSpPr>
+        <p:spPr>
+          <a:xfrm>
+            <a:off x="76200" y="6400800"/>
+            <a:ext cx="5618846" cy="369332"/>
+          </a:xfrm>
+          <a:prstGeom prst="rect">
+            <a:avLst/>
+          </a:prstGeom>
+        </p:spPr>
+        <p:txBody>
+          <a:bodyPr wrap="none">
+            <a:spAutoFit/>
+          </a:bodyPr>
+          <a:lstStyle/>
+          <a:p>
+            <a:r>
+              <a:rPr lang="en-US" dirty="0"/>
+              <a:t>plot(d1$J12_18, type='l', </a:t>
+            </a:r>
+            <a:r>
+              <a:rPr lang="en-US" dirty="0" err="1">
+                <a:solidFill>
+                  <a:srgbClr val="FF0000"/>
+                </a:solidFill>
+              </a:rPr>
+              <a:t>ylim</a:t>
+            </a:r>
+            <a:r>
+              <a:rPr lang="en-US" dirty="0">
+                <a:solidFill>
+                  <a:srgbClr val="FF0000"/>
+                </a:solidFill>
+              </a:rPr>
+              <a:t>=c(0, max(d1$J12_18)))</a:t>
+            </a:r>
+          </a:p>
+        </p:txBody>
+      </p:sp>
       <p:pic>
         <p:nvPicPr>
-          <p:cNvPr id="4" name="Picture 3">
+          <p:cNvPr id="6" name="Picture 5">
             <a:extLst>
               <a:ext uri="{FF2B5EF4-FFF2-40B4-BE49-F238E27FC236}">
-                <a16:creationId xmlns:a16="http://schemas.microsoft.com/office/drawing/2014/main" id="{E3E10157-005B-4319-9A10-9626E76FCB99}"/>
+                <a16:creationId xmlns:a16="http://schemas.microsoft.com/office/drawing/2014/main" id="{31F1FF46-2A96-476A-87B8-6FD0B8E24079}"/>
               </a:ext>
             </a:extLst>
           </p:cNvPr>
@@ -8318,7 +7563,7 @@
         </p:blipFill>
         <p:spPr>
           <a:xfrm>
-            <a:off x="4114800" y="1864664"/>
+            <a:off x="3733800" y="1706565"/>
             <a:ext cx="3752381" cy="3580952"/>
           </a:xfrm>
           <a:prstGeom prst="rect">
@@ -8326,44 +7571,10 @@
           </a:prstGeom>
         </p:spPr>
       </p:pic>
-      <p:sp>
-        <p:nvSpPr>
-          <p:cNvPr id="5" name="Rectangle 4">
-            <a:extLst>
-              <a:ext uri="{FF2B5EF4-FFF2-40B4-BE49-F238E27FC236}">
-                <a16:creationId xmlns:a16="http://schemas.microsoft.com/office/drawing/2014/main" id="{721D33A1-DD50-4323-BB4F-BDEB3EA09031}"/>
-              </a:ext>
-            </a:extLst>
-          </p:cNvPr>
-          <p:cNvSpPr/>
-          <p:nvPr/>
-        </p:nvSpPr>
-        <p:spPr>
-          <a:xfrm>
-            <a:off x="76200" y="6324600"/>
-            <a:ext cx="2688557" cy="369332"/>
-          </a:xfrm>
-          <a:prstGeom prst="rect">
-            <a:avLst/>
-          </a:prstGeom>
-        </p:spPr>
-        <p:txBody>
-          <a:bodyPr wrap="none">
-            <a:spAutoFit/>
-          </a:bodyPr>
-          <a:lstStyle/>
-          <a:p>
-            <a:r>
-              <a:rPr lang="en-US" dirty="0"/>
-              <a:t>plot(d1$J12_18, type='l')</a:t>
-            </a:r>
-          </a:p>
-        </p:txBody>
-      </p:sp>
     </p:spTree>
     <p:extLst>
       <p:ext uri="{BB962C8B-B14F-4D97-AF65-F5344CB8AC3E}">
-        <p14:creationId xmlns:p14="http://schemas.microsoft.com/office/powerpoint/2010/main" val="2190071954"/>
+        <p14:creationId xmlns:p14="http://schemas.microsoft.com/office/powerpoint/2010/main" val="3342025284"/>
       </p:ext>
     </p:extLst>
   </p:cSld>
@@ -8395,7 +7606,7 @@
           <p:cNvPr id="2" name="Title 1">
             <a:extLst>
               <a:ext uri="{FF2B5EF4-FFF2-40B4-BE49-F238E27FC236}">
-                <a16:creationId xmlns:a16="http://schemas.microsoft.com/office/drawing/2014/main" id="{C706FDAF-53B9-4383-8070-028AA792A831}"/>
+                <a16:creationId xmlns:a16="http://schemas.microsoft.com/office/drawing/2014/main" id="{BE1110A8-DC02-4E41-84F9-5C2356871BC7}"/>
               </a:ext>
             </a:extLst>
           </p:cNvPr>
@@ -8413,7 +7624,7 @@
           <a:p>
             <a:r>
               <a:rPr lang="en-US" dirty="0"/>
-              <a:t>Extend y axis to 0</a:t>
+              <a:t>Remove unnecessary borders</a:t>
             </a:r>
           </a:p>
         </p:txBody>
@@ -8423,7 +7634,7 @@
           <p:cNvPr id="3" name="Content Placeholder 2">
             <a:extLst>
               <a:ext uri="{FF2B5EF4-FFF2-40B4-BE49-F238E27FC236}">
-                <a16:creationId xmlns:a16="http://schemas.microsoft.com/office/drawing/2014/main" id="{D5EFD609-3AD1-432C-AC50-AD47028C8A33}"/>
+                <a16:creationId xmlns:a16="http://schemas.microsoft.com/office/drawing/2014/main" id="{DC7D22BD-3298-4D54-AF5D-B65524A5A8C7}"/>
               </a:ext>
             </a:extLst>
           </p:cNvPr>
@@ -8448,7 +7659,7 @@
           <p:cNvPr id="5" name="Rectangle 4">
             <a:extLst>
               <a:ext uri="{FF2B5EF4-FFF2-40B4-BE49-F238E27FC236}">
-                <a16:creationId xmlns:a16="http://schemas.microsoft.com/office/drawing/2014/main" id="{B593BBD2-60F6-4A89-83A5-ED2EF63E3F30}"/>
+                <a16:creationId xmlns:a16="http://schemas.microsoft.com/office/drawing/2014/main" id="{5F339E11-86DF-4B15-B853-5590B45C852C}"/>
               </a:ext>
             </a:extLst>
           </p:cNvPr>
@@ -8457,15 +7668,15 @@
         </p:nvSpPr>
         <p:spPr>
           <a:xfrm>
-            <a:off x="76200" y="6400800"/>
-            <a:ext cx="5618846" cy="369332"/>
+            <a:off x="457200" y="6097369"/>
+            <a:ext cx="10820400" cy="369332"/>
           </a:xfrm>
           <a:prstGeom prst="rect">
             <a:avLst/>
           </a:prstGeom>
         </p:spPr>
         <p:txBody>
-          <a:bodyPr wrap="none">
+          <a:bodyPr wrap="square">
             <a:spAutoFit/>
           </a:bodyPr>
           <a:lstStyle/>
@@ -8473,6 +7684,22 @@
             <a:r>
               <a:rPr lang="en-US" dirty="0"/>
               <a:t>plot(d1$J12_18, type='l', </a:t>
+            </a:r>
+            <a:r>
+              <a:rPr lang="en-US" dirty="0" err="1"/>
+              <a:t>ylim</a:t>
+            </a:r>
+            <a:r>
+              <a:rPr lang="en-US" dirty="0"/>
+              <a:t>=c(0, max(d1$J12_18)),</a:t>
+            </a:r>
+            <a:r>
+              <a:rPr lang="en-US" dirty="0">
+                <a:solidFill>
+                  <a:srgbClr val="FF0000"/>
+                </a:solidFill>
+              </a:rPr>
+              <a:t> </a:t>
             </a:r>
             <a:r>
               <a:rPr lang="en-US" dirty="0" err="1">
@@ -8480,7 +7707,7 @@
                   <a:srgbClr val="FF0000"/>
                 </a:solidFill>
               </a:rPr>
-              <a:t>ylim</a:t>
+              <a:t>bty</a:t>
             </a:r>
             <a:r>
               <a:rPr lang="en-US" dirty="0">
@@ -8488,7 +7715,7 @@
                   <a:srgbClr val="FF0000"/>
                 </a:solidFill>
               </a:rPr>
-              <a:t>=c(0, max(d1$J12_18)))</a:t>
+              <a:t>='l')</a:t>
             </a:r>
           </a:p>
         </p:txBody>
@@ -8498,7 +7725,7 @@
           <p:cNvPr id="6" name="Picture 5">
             <a:extLst>
               <a:ext uri="{FF2B5EF4-FFF2-40B4-BE49-F238E27FC236}">
-                <a16:creationId xmlns:a16="http://schemas.microsoft.com/office/drawing/2014/main" id="{31F1FF46-2A96-476A-87B8-6FD0B8E24079}"/>
+                <a16:creationId xmlns:a16="http://schemas.microsoft.com/office/drawing/2014/main" id="{CC39D9C4-B740-41EA-817E-5AF08350685D}"/>
               </a:ext>
             </a:extLst>
           </p:cNvPr>
@@ -8515,7 +7742,7 @@
         </p:blipFill>
         <p:spPr>
           <a:xfrm>
-            <a:off x="3733800" y="1706565"/>
+            <a:off x="4270609" y="1981201"/>
             <a:ext cx="3752381" cy="3580952"/>
           </a:xfrm>
           <a:prstGeom prst="rect">
@@ -8526,7 +7753,7 @@
     </p:spTree>
     <p:extLst>
       <p:ext uri="{BB962C8B-B14F-4D97-AF65-F5344CB8AC3E}">
-        <p14:creationId xmlns:p14="http://schemas.microsoft.com/office/powerpoint/2010/main" val="3342025284"/>
+        <p14:creationId xmlns:p14="http://schemas.microsoft.com/office/powerpoint/2010/main" val="1722873426"/>
       </p:ext>
     </p:extLst>
   </p:cSld>
@@ -8558,7 +7785,7 @@
           <p:cNvPr id="2" name="Title 1">
             <a:extLst>
               <a:ext uri="{FF2B5EF4-FFF2-40B4-BE49-F238E27FC236}">
-                <a16:creationId xmlns:a16="http://schemas.microsoft.com/office/drawing/2014/main" id="{BE1110A8-DC02-4E41-84F9-5C2356871BC7}"/>
+                <a16:creationId xmlns:a16="http://schemas.microsoft.com/office/drawing/2014/main" id="{41D31971-ED5B-4579-ABC8-16F8399165F3}"/>
               </a:ext>
             </a:extLst>
           </p:cNvPr>
@@ -8576,108 +7803,17 @@
           <a:p>
             <a:r>
               <a:rPr lang="en-US" dirty="0"/>
-              <a:t>Remove unnecessary borders</a:t>
-            </a:r>
-          </a:p>
-        </p:txBody>
-      </p:sp>
-      <p:sp>
-        <p:nvSpPr>
-          <p:cNvPr id="3" name="Content Placeholder 2">
+              <a:t>Fix axes</a:t>
+            </a:r>
+          </a:p>
+        </p:txBody>
+      </p:sp>
+      <p:pic>
+        <p:nvPicPr>
+          <p:cNvPr id="4" name="Picture 3">
             <a:extLst>
               <a:ext uri="{FF2B5EF4-FFF2-40B4-BE49-F238E27FC236}">
-                <a16:creationId xmlns:a16="http://schemas.microsoft.com/office/drawing/2014/main" id="{DC7D22BD-3298-4D54-AF5D-B65524A5A8C7}"/>
-              </a:ext>
-            </a:extLst>
-          </p:cNvPr>
-          <p:cNvSpPr>
-            <a:spLocks noGrp="1"/>
-          </p:cNvSpPr>
-          <p:nvPr>
-            <p:ph idx="1"/>
-          </p:nvPr>
-        </p:nvSpPr>
-        <p:spPr/>
-        <p:txBody>
-          <a:bodyPr/>
-          <a:lstStyle/>
-          <a:p>
-            <a:endParaRPr lang="en-US"/>
-          </a:p>
-        </p:txBody>
-      </p:sp>
-      <p:sp>
-        <p:nvSpPr>
-          <p:cNvPr id="5" name="Rectangle 4">
-            <a:extLst>
-              <a:ext uri="{FF2B5EF4-FFF2-40B4-BE49-F238E27FC236}">
-                <a16:creationId xmlns:a16="http://schemas.microsoft.com/office/drawing/2014/main" id="{5F339E11-86DF-4B15-B853-5590B45C852C}"/>
-              </a:ext>
-            </a:extLst>
-          </p:cNvPr>
-          <p:cNvSpPr/>
-          <p:nvPr/>
-        </p:nvSpPr>
-        <p:spPr>
-          <a:xfrm>
-            <a:off x="457200" y="6097369"/>
-            <a:ext cx="10820400" cy="369332"/>
-          </a:xfrm>
-          <a:prstGeom prst="rect">
-            <a:avLst/>
-          </a:prstGeom>
-        </p:spPr>
-        <p:txBody>
-          <a:bodyPr wrap="square">
-            <a:spAutoFit/>
-          </a:bodyPr>
-          <a:lstStyle/>
-          <a:p>
-            <a:r>
-              <a:rPr lang="en-US" dirty="0"/>
-              <a:t>plot(d1$J12_18, type='l', </a:t>
-            </a:r>
-            <a:r>
-              <a:rPr lang="en-US" dirty="0" err="1"/>
-              <a:t>ylim</a:t>
-            </a:r>
-            <a:r>
-              <a:rPr lang="en-US" dirty="0"/>
-              <a:t>=c(0, max(d1$J12_18)),</a:t>
-            </a:r>
-            <a:r>
-              <a:rPr lang="en-US" dirty="0">
-                <a:solidFill>
-                  <a:srgbClr val="FF0000"/>
-                </a:solidFill>
-              </a:rPr>
-              <a:t> </a:t>
-            </a:r>
-            <a:r>
-              <a:rPr lang="en-US" dirty="0" err="1">
-                <a:solidFill>
-                  <a:srgbClr val="FF0000"/>
-                </a:solidFill>
-              </a:rPr>
-              <a:t>bty</a:t>
-            </a:r>
-            <a:r>
-              <a:rPr lang="en-US" dirty="0">
-                <a:solidFill>
-                  <a:srgbClr val="FF0000"/>
-                </a:solidFill>
-              </a:rPr>
-              <a:t>='l')</a:t>
-            </a:r>
-          </a:p>
-        </p:txBody>
-      </p:sp>
-      <p:pic>
-        <p:nvPicPr>
-          <p:cNvPr id="6" name="Picture 5">
-            <a:extLst>
-              <a:ext uri="{FF2B5EF4-FFF2-40B4-BE49-F238E27FC236}">
-                <a16:creationId xmlns:a16="http://schemas.microsoft.com/office/drawing/2014/main" id="{CC39D9C4-B740-41EA-817E-5AF08350685D}"/>
+                <a16:creationId xmlns:a16="http://schemas.microsoft.com/office/drawing/2014/main" id="{8FCADB2E-DC84-4552-AC1B-BA9C3B2CD7CE}"/>
               </a:ext>
             </a:extLst>
           </p:cNvPr>
@@ -8694,7 +7830,7 @@
         </p:blipFill>
         <p:spPr>
           <a:xfrm>
-            <a:off x="4270609" y="1981201"/>
+            <a:off x="4219809" y="1676400"/>
             <a:ext cx="3752381" cy="3580952"/>
           </a:xfrm>
           <a:prstGeom prst="rect">
@@ -8702,10 +7838,152 @@
           </a:prstGeom>
         </p:spPr>
       </p:pic>
+      <p:sp>
+        <p:nvSpPr>
+          <p:cNvPr id="5" name="Rectangle 4">
+            <a:extLst>
+              <a:ext uri="{FF2B5EF4-FFF2-40B4-BE49-F238E27FC236}">
+                <a16:creationId xmlns:a16="http://schemas.microsoft.com/office/drawing/2014/main" id="{2CD729E1-41DD-479D-896D-0097E49BC21A}"/>
+              </a:ext>
+            </a:extLst>
+          </p:cNvPr>
+          <p:cNvSpPr/>
+          <p:nvPr/>
+        </p:nvSpPr>
+        <p:spPr>
+          <a:xfrm>
+            <a:off x="914400" y="5604611"/>
+            <a:ext cx="9829800" cy="1169551"/>
+          </a:xfrm>
+          <a:prstGeom prst="rect">
+            <a:avLst/>
+          </a:prstGeom>
+        </p:spPr>
+        <p:txBody>
+          <a:bodyPr wrap="square">
+            <a:spAutoFit/>
+          </a:bodyPr>
+          <a:lstStyle/>
+          <a:p>
+            <a:r>
+              <a:rPr lang="en-US" sz="1400" dirty="0"/>
+              <a:t>plot(</a:t>
+            </a:r>
+            <a:r>
+              <a:rPr lang="en-US" sz="1400" dirty="0" err="1"/>
+              <a:t>as.Date</a:t>
+            </a:r>
+            <a:r>
+              <a:rPr lang="en-US" sz="1400" dirty="0"/>
+              <a:t>(d1$date),d1$J12_18, type='l', </a:t>
+            </a:r>
+            <a:r>
+              <a:rPr lang="en-US" sz="1400" dirty="0" err="1"/>
+              <a:t>ylim</a:t>
+            </a:r>
+            <a:r>
+              <a:rPr lang="en-US" sz="1400" dirty="0"/>
+              <a:t>=c(0, max(d1$J12_18)), </a:t>
+            </a:r>
+            <a:r>
+              <a:rPr lang="en-US" sz="1400" dirty="0" err="1"/>
+              <a:t>bty</a:t>
+            </a:r>
+            <a:r>
+              <a:rPr lang="en-US" sz="1400" dirty="0"/>
+              <a:t>='l', </a:t>
+            </a:r>
+          </a:p>
+          <a:p>
+            <a:r>
+              <a:rPr lang="en-US" sz="1400" dirty="0"/>
+              <a:t>          </a:t>
+            </a:r>
+            <a:r>
+              <a:rPr lang="en-US" sz="1400" dirty="0" err="1"/>
+              <a:t>ylab</a:t>
+            </a:r>
+            <a:r>
+              <a:rPr lang="en-US" sz="1400" dirty="0"/>
+              <a:t>="Hospitalizations", </a:t>
+            </a:r>
+            <a:r>
+              <a:rPr lang="en-US" sz="1400" dirty="0" err="1"/>
+              <a:t>xlab</a:t>
+            </a:r>
+            <a:r>
+              <a:rPr lang="en-US" sz="1400" dirty="0"/>
+              <a:t>='Date', </a:t>
+            </a:r>
+            <a:r>
+              <a:rPr lang="en-US" sz="1400" dirty="0" err="1"/>
+              <a:t>xaxt</a:t>
+            </a:r>
+            <a:r>
+              <a:rPr lang="en-US" sz="1400" dirty="0"/>
+              <a:t>='n', </a:t>
+            </a:r>
+            <a:r>
+              <a:rPr lang="en-US" sz="1400" dirty="0" err="1"/>
+              <a:t>yaxt</a:t>
+            </a:r>
+            <a:r>
+              <a:rPr lang="en-US" sz="1400" dirty="0"/>
+              <a:t>='n')</a:t>
+            </a:r>
+          </a:p>
+          <a:p>
+            <a:r>
+              <a:rPr lang="en-US" sz="1400" dirty="0" err="1"/>
+              <a:t>date.labs</a:t>
+            </a:r>
+            <a:r>
+              <a:rPr lang="en-US" sz="1400" dirty="0"/>
+              <a:t>&lt;- </a:t>
+            </a:r>
+            <a:r>
+              <a:rPr lang="en-US" sz="1400" dirty="0" err="1"/>
+              <a:t>as.Date</a:t>
+            </a:r>
+            <a:r>
+              <a:rPr lang="en-US" sz="1400" dirty="0"/>
+              <a:t>(c("2004-01-01",'2006-01-01','2008-01-01', '2010-01-01','2012-01-01','2014-01-01'))</a:t>
+            </a:r>
+          </a:p>
+          <a:p>
+            <a:r>
+              <a:rPr lang="en-US" sz="1400" dirty="0"/>
+              <a:t>axis(side=1, at=</a:t>
+            </a:r>
+            <a:r>
+              <a:rPr lang="en-US" sz="1400" dirty="0" err="1"/>
+              <a:t>date.labs</a:t>
+            </a:r>
+            <a:r>
+              <a:rPr lang="en-US" sz="1400" dirty="0"/>
+              <a:t>, labels=c("2004","2006","2008","2010","2012","2014"))</a:t>
+            </a:r>
+          </a:p>
+          <a:p>
+            <a:r>
+              <a:rPr lang="en-US" sz="1400" dirty="0"/>
+              <a:t>axis(side=2, at=</a:t>
+            </a:r>
+            <a:r>
+              <a:rPr lang="en-US" sz="1400" dirty="0" err="1"/>
+              <a:t>seq</a:t>
+            </a:r>
+            <a:r>
+              <a:rPr lang="en-US" sz="1400" dirty="0"/>
+              <a:t>(from=0,to=20000, by=4000), labels=T)</a:t>
+            </a:r>
+          </a:p>
+        </p:txBody>
+      </p:sp>
     </p:spTree>
     <p:extLst>
       <p:ext uri="{BB962C8B-B14F-4D97-AF65-F5344CB8AC3E}">
-        <p14:creationId xmlns:p14="http://schemas.microsoft.com/office/powerpoint/2010/main" val="1722873426"/>
+        <p14:creationId xmlns:p14="http://schemas.microsoft.com/office/powerpoint/2010/main" val="2242372852"/>
       </p:ext>
     </p:extLst>
   </p:cSld>
@@ -8737,7 +8015,7 @@
           <p:cNvPr id="2" name="Title 1">
             <a:extLst>
               <a:ext uri="{FF2B5EF4-FFF2-40B4-BE49-F238E27FC236}">
-                <a16:creationId xmlns:a16="http://schemas.microsoft.com/office/drawing/2014/main" id="{41D31971-ED5B-4579-ABC8-16F8399165F3}"/>
+                <a16:creationId xmlns:a16="http://schemas.microsoft.com/office/drawing/2014/main" id="{6C9AFDC2-8F94-4777-8771-C43AAB8B4441}"/>
               </a:ext>
             </a:extLst>
           </p:cNvPr>
@@ -8755,7 +8033,7 @@
           <a:p>
             <a:r>
               <a:rPr lang="en-US" dirty="0"/>
-              <a:t>Fix axes</a:t>
+              <a:t>Stretch x-axis</a:t>
             </a:r>
           </a:p>
         </p:txBody>
@@ -8765,7 +8043,7 @@
           <p:cNvPr id="4" name="Picture 3">
             <a:extLst>
               <a:ext uri="{FF2B5EF4-FFF2-40B4-BE49-F238E27FC236}">
-                <a16:creationId xmlns:a16="http://schemas.microsoft.com/office/drawing/2014/main" id="{8FCADB2E-DC84-4552-AC1B-BA9C3B2CD7CE}"/>
+                <a16:creationId xmlns:a16="http://schemas.microsoft.com/office/drawing/2014/main" id="{5C02037D-AFAC-4082-9B5D-1598D85E49F2}"/>
               </a:ext>
             </a:extLst>
           </p:cNvPr>
@@ -8782,160 +8060,18 @@
         </p:blipFill>
         <p:spPr>
           <a:xfrm>
-            <a:off x="4219809" y="1676400"/>
-            <a:ext cx="3752381" cy="3580952"/>
+            <a:off x="2971800" y="1752600"/>
+            <a:ext cx="6485714" cy="4723809"/>
           </a:xfrm>
           <a:prstGeom prst="rect">
             <a:avLst/>
           </a:prstGeom>
         </p:spPr>
       </p:pic>
-      <p:sp>
-        <p:nvSpPr>
-          <p:cNvPr id="5" name="Rectangle 4">
-            <a:extLst>
-              <a:ext uri="{FF2B5EF4-FFF2-40B4-BE49-F238E27FC236}">
-                <a16:creationId xmlns:a16="http://schemas.microsoft.com/office/drawing/2014/main" id="{2CD729E1-41DD-479D-896D-0097E49BC21A}"/>
-              </a:ext>
-            </a:extLst>
-          </p:cNvPr>
-          <p:cNvSpPr/>
-          <p:nvPr/>
-        </p:nvSpPr>
-        <p:spPr>
-          <a:xfrm>
-            <a:off x="914400" y="5604611"/>
-            <a:ext cx="9829800" cy="1169551"/>
-          </a:xfrm>
-          <a:prstGeom prst="rect">
-            <a:avLst/>
-          </a:prstGeom>
-        </p:spPr>
-        <p:txBody>
-          <a:bodyPr wrap="square">
-            <a:spAutoFit/>
-          </a:bodyPr>
-          <a:lstStyle/>
-          <a:p>
-            <a:r>
-              <a:rPr lang="en-US" sz="1400" dirty="0"/>
-              <a:t>plot(</a:t>
-            </a:r>
-            <a:r>
-              <a:rPr lang="en-US" sz="1400" dirty="0" err="1"/>
-              <a:t>as.Date</a:t>
-            </a:r>
-            <a:r>
-              <a:rPr lang="en-US" sz="1400" dirty="0"/>
-              <a:t>(d1$date),d1$J12_18, type='l', </a:t>
-            </a:r>
-            <a:r>
-              <a:rPr lang="en-US" sz="1400" dirty="0" err="1"/>
-              <a:t>ylim</a:t>
-            </a:r>
-            <a:r>
-              <a:rPr lang="en-US" sz="1400" dirty="0"/>
-              <a:t>=c(0, max(d1$J12_18)), </a:t>
-            </a:r>
-            <a:r>
-              <a:rPr lang="en-US" sz="1400" dirty="0" err="1"/>
-              <a:t>bty</a:t>
-            </a:r>
-            <a:r>
-              <a:rPr lang="en-US" sz="1400" dirty="0"/>
-              <a:t>='l', </a:t>
-            </a:r>
-          </a:p>
-          <a:p>
-            <a:r>
-              <a:rPr lang="en-US" sz="1400" dirty="0"/>
-              <a:t>          </a:t>
-            </a:r>
-            <a:r>
-              <a:rPr lang="en-US" sz="1400" dirty="0" err="1"/>
-              <a:t>ylab</a:t>
-            </a:r>
-            <a:r>
-              <a:rPr lang="en-US" sz="1400" dirty="0"/>
-              <a:t>="Hospitalizations", </a:t>
-            </a:r>
-            <a:r>
-              <a:rPr lang="en-US" sz="1400" dirty="0" err="1"/>
-              <a:t>xlab</a:t>
-            </a:r>
-            <a:r>
-              <a:rPr lang="en-US" sz="1400" dirty="0"/>
-              <a:t>='Date', </a:t>
-            </a:r>
-            <a:r>
-              <a:rPr lang="en-US" sz="1400" dirty="0" err="1"/>
-              <a:t>xaxt</a:t>
-            </a:r>
-            <a:r>
-              <a:rPr lang="en-US" sz="1400" dirty="0"/>
-              <a:t>='n', </a:t>
-            </a:r>
-            <a:r>
-              <a:rPr lang="en-US" sz="1400" dirty="0" err="1"/>
-              <a:t>yaxt</a:t>
-            </a:r>
-            <a:r>
-              <a:rPr lang="en-US" sz="1400" dirty="0"/>
-              <a:t>='n')</a:t>
-            </a:r>
-          </a:p>
-          <a:p>
-            <a:r>
-              <a:rPr lang="en-US" sz="1400" dirty="0" err="1"/>
-              <a:t>date.labs</a:t>
-            </a:r>
-            <a:r>
-              <a:rPr lang="en-US" sz="1400" dirty="0"/>
-              <a:t>&lt;- </a:t>
-            </a:r>
-            <a:r>
-              <a:rPr lang="en-US" sz="1400" dirty="0" err="1"/>
-              <a:t>as.Date</a:t>
-            </a:r>
-            <a:r>
-              <a:rPr lang="en-US" sz="1400" dirty="0"/>
-              <a:t>(c("2004-01-01",'2006-01-01','2008-01-01', '2010-01-01','2012-01-01','2014-01-01'))</a:t>
-            </a:r>
-          </a:p>
-          <a:p>
-            <a:r>
-              <a:rPr lang="en-US" sz="1400" dirty="0"/>
-              <a:t>axis(side=1, at=</a:t>
-            </a:r>
-            <a:r>
-              <a:rPr lang="en-US" sz="1400" dirty="0" err="1"/>
-              <a:t>date.labs</a:t>
-            </a:r>
-            <a:r>
-              <a:rPr lang="en-US" sz="1400" dirty="0"/>
-              <a:t>, labels=c("2004","2006","2008","2010","2012","2014"))</a:t>
-            </a:r>
-          </a:p>
-          <a:p>
-            <a:r>
-              <a:rPr lang="en-US" sz="1400" dirty="0"/>
-              <a:t>axis(side=2, at=</a:t>
-            </a:r>
-            <a:r>
-              <a:rPr lang="en-US" sz="1400" dirty="0" err="1"/>
-              <a:t>seq</a:t>
-            </a:r>
-            <a:r>
-              <a:rPr lang="en-US" sz="1400" dirty="0"/>
-              <a:t>(from=0,to=20000, by=4000), labels=T)</a:t>
-            </a:r>
-          </a:p>
-        </p:txBody>
-      </p:sp>
     </p:spTree>
     <p:extLst>
       <p:ext uri="{BB962C8B-B14F-4D97-AF65-F5344CB8AC3E}">
-        <p14:creationId xmlns:p14="http://schemas.microsoft.com/office/powerpoint/2010/main" val="2242372852"/>
+        <p14:creationId xmlns:p14="http://schemas.microsoft.com/office/powerpoint/2010/main" val="3623414119"/>
       </p:ext>
     </p:extLst>
   </p:cSld>

</xml_diff>